<commit_message>
Changes according to rehersal comments
</commit_message>
<xml_diff>
--- a/TypeScript- Superheroic Power In Angular.pptx
+++ b/TypeScript- Superheroic Power In Angular.pptx
@@ -5,7 +5,7 @@
     <p:sldMasterId id="2147483673" r:id="rId1"/>
   </p:sldMasterIdLst>
   <p:notesMasterIdLst>
-    <p:notesMasterId r:id="rId40"/>
+    <p:notesMasterId r:id="rId41"/>
   </p:notesMasterIdLst>
   <p:sldIdLst>
     <p:sldId id="256" r:id="rId2"/>
@@ -27,49 +27,50 @@
     <p:sldId id="272" r:id="rId18"/>
     <p:sldId id="273" r:id="rId19"/>
     <p:sldId id="274" r:id="rId20"/>
-    <p:sldId id="275" r:id="rId21"/>
-    <p:sldId id="276" r:id="rId22"/>
-    <p:sldId id="277" r:id="rId23"/>
-    <p:sldId id="278" r:id="rId24"/>
-    <p:sldId id="279" r:id="rId25"/>
-    <p:sldId id="280" r:id="rId26"/>
-    <p:sldId id="281" r:id="rId27"/>
-    <p:sldId id="282" r:id="rId28"/>
-    <p:sldId id="283" r:id="rId29"/>
-    <p:sldId id="284" r:id="rId30"/>
-    <p:sldId id="285" r:id="rId31"/>
-    <p:sldId id="286" r:id="rId32"/>
-    <p:sldId id="287" r:id="rId33"/>
-    <p:sldId id="288" r:id="rId34"/>
-    <p:sldId id="289" r:id="rId35"/>
-    <p:sldId id="290" r:id="rId36"/>
-    <p:sldId id="291" r:id="rId37"/>
-    <p:sldId id="292" r:id="rId38"/>
-    <p:sldId id="293" r:id="rId39"/>
+    <p:sldId id="294" r:id="rId21"/>
+    <p:sldId id="275" r:id="rId22"/>
+    <p:sldId id="276" r:id="rId23"/>
+    <p:sldId id="277" r:id="rId24"/>
+    <p:sldId id="278" r:id="rId25"/>
+    <p:sldId id="279" r:id="rId26"/>
+    <p:sldId id="280" r:id="rId27"/>
+    <p:sldId id="281" r:id="rId28"/>
+    <p:sldId id="282" r:id="rId29"/>
+    <p:sldId id="283" r:id="rId30"/>
+    <p:sldId id="284" r:id="rId31"/>
+    <p:sldId id="285" r:id="rId32"/>
+    <p:sldId id="286" r:id="rId33"/>
+    <p:sldId id="287" r:id="rId34"/>
+    <p:sldId id="288" r:id="rId35"/>
+    <p:sldId id="289" r:id="rId36"/>
+    <p:sldId id="290" r:id="rId37"/>
+    <p:sldId id="291" r:id="rId38"/>
+    <p:sldId id="292" r:id="rId39"/>
+    <p:sldId id="293" r:id="rId40"/>
   </p:sldIdLst>
   <p:sldSz cx="9144000" cy="5143500" type="screen16x9"/>
   <p:notesSz cx="6858000" cy="9144000"/>
   <p:embeddedFontLst>
     <p:embeddedFont>
-      <p:font typeface="Roboto" panose="020B0604020202020204" charset="0"/>
-      <p:regular r:id="rId41"/>
-      <p:bold r:id="rId42"/>
-      <p:italic r:id="rId43"/>
-      <p:boldItalic r:id="rId44"/>
+      <p:font typeface="Quattrocento Sans" panose="020B0604020202020204" charset="0"/>
+      <p:regular r:id="rId42"/>
+      <p:bold r:id="rId43"/>
+      <p:italic r:id="rId44"/>
+      <p:boldItalic r:id="rId45"/>
     </p:embeddedFont>
     <p:embeddedFont>
-      <p:font typeface="Quattrocento Sans" panose="020B0604020202020204" charset="0"/>
-      <p:regular r:id="rId45"/>
-      <p:bold r:id="rId46"/>
-      <p:italic r:id="rId47"/>
-      <p:boldItalic r:id="rId48"/>
+      <p:font typeface="Roboto" panose="020B0604020202020204" charset="0"/>
+      <p:regular r:id="rId46"/>
+      <p:bold r:id="rId47"/>
+      <p:italic r:id="rId48"/>
+      <p:boldItalic r:id="rId49"/>
     </p:embeddedFont>
     <p:embeddedFont>
       <p:font typeface="Consolas" panose="020B0609020204030204" pitchFamily="49" charset="0"/>
-      <p:regular r:id="rId49"/>
-      <p:bold r:id="rId50"/>
-      <p:italic r:id="rId51"/>
-      <p:boldItalic r:id="rId52"/>
+      <p:regular r:id="rId50"/>
+      <p:bold r:id="rId51"/>
+      <p:italic r:id="rId52"/>
+      <p:boldItalic r:id="rId53"/>
     </p:embeddedFont>
   </p:embeddedFontLst>
   <p:defaultTextStyle>
@@ -907,6 +908,416 @@
               </a:rPr>
               <a:t>5 min</a:t>
             </a:r>
+          </a:p>
+          <a:p>
+            <a:pPr marL="0" marR="0" lvl="0" indent="0" algn="l" rtl="0">
+              <a:spcBef>
+                <a:spcPts val="0"/>
+              </a:spcBef>
+              <a:buClr>
+                <a:schemeClr val="dk1"/>
+              </a:buClr>
+              <a:buSzPct val="25000"/>
+              <a:buFont typeface="Arial"/>
+              <a:buNone/>
+            </a:pPr>
+            <a:endParaRPr lang="en-US" sz="1100" b="0" i="0" u="none" strike="noStrike" cap="none" dirty="0">
+              <a:solidFill>
+                <a:schemeClr val="dk1"/>
+              </a:solidFill>
+              <a:latin typeface="Arial"/>
+              <a:ea typeface="Arial"/>
+              <a:cs typeface="Arial"/>
+              <a:sym typeface="Arial"/>
+            </a:endParaRPr>
+          </a:p>
+          <a:p>
+            <a:pPr marL="0" marR="0" lvl="0" indent="0" algn="l" rtl="0">
+              <a:spcBef>
+                <a:spcPts val="0"/>
+              </a:spcBef>
+              <a:buClr>
+                <a:schemeClr val="dk1"/>
+              </a:buClr>
+              <a:buSzPct val="25000"/>
+              <a:buFont typeface="Arial"/>
+              <a:buNone/>
+            </a:pPr>
+            <a:r>
+              <a:rPr lang="en-US" sz="1100" b="0" i="0" u="none" strike="noStrike" cap="none" dirty="0">
+                <a:solidFill>
+                  <a:schemeClr val="dk1"/>
+                </a:solidFill>
+                <a:latin typeface="Arial"/>
+                <a:ea typeface="Arial"/>
+                <a:cs typeface="Arial"/>
+                <a:sym typeface="Arial"/>
+              </a:rPr>
+              <a:t>Mention</a:t>
+            </a:r>
+            <a:r>
+              <a:rPr lang="en-US" sz="1100" b="0" i="0" u="none" strike="noStrike" cap="none" baseline="0" dirty="0">
+                <a:solidFill>
+                  <a:schemeClr val="dk1"/>
+                </a:solidFill>
+                <a:latin typeface="Arial"/>
+                <a:ea typeface="Arial"/>
+                <a:cs typeface="Arial"/>
+                <a:sym typeface="Arial"/>
+              </a:rPr>
+              <a:t> </a:t>
+            </a:r>
+            <a:r>
+              <a:rPr lang="en-US" sz="1100" b="0" i="0" u="none" strike="noStrike" cap="none" dirty="0" err="1">
+                <a:solidFill>
+                  <a:schemeClr val="dk1"/>
+                </a:solidFill>
+                <a:latin typeface="Arial"/>
+                <a:ea typeface="Arial"/>
+                <a:cs typeface="Arial"/>
+                <a:sym typeface="Arial"/>
+              </a:rPr>
+              <a:t>VSCode</a:t>
+            </a:r>
+            <a:r>
+              <a:rPr lang="en-US" sz="1100" b="0" i="0" u="none" strike="noStrike" cap="none" dirty="0">
+                <a:solidFill>
+                  <a:schemeClr val="dk1"/>
+                </a:solidFill>
+                <a:latin typeface="Arial"/>
+                <a:ea typeface="Arial"/>
+                <a:cs typeface="Arial"/>
+                <a:sym typeface="Arial"/>
+              </a:rPr>
+              <a:t> </a:t>
+            </a:r>
+          </a:p>
+          <a:p>
+            <a:pPr marL="0" marR="0" lvl="0" indent="0" algn="l" rtl="0">
+              <a:spcBef>
+                <a:spcPts val="0"/>
+              </a:spcBef>
+              <a:buClr>
+                <a:schemeClr val="dk1"/>
+              </a:buClr>
+              <a:buSzPct val="25000"/>
+              <a:buFont typeface="Arial"/>
+              <a:buNone/>
+            </a:pPr>
+            <a:endParaRPr lang="en-US" sz="1100" b="0" i="0" u="none" strike="noStrike" cap="none" dirty="0">
+              <a:solidFill>
+                <a:schemeClr val="dk1"/>
+              </a:solidFill>
+              <a:latin typeface="Arial"/>
+              <a:ea typeface="Arial"/>
+              <a:cs typeface="Arial"/>
+              <a:sym typeface="Arial"/>
+            </a:endParaRPr>
+          </a:p>
+          <a:p>
+            <a:pPr marL="0" marR="0" lvl="0" indent="0" algn="l" rtl="0">
+              <a:spcBef>
+                <a:spcPts val="0"/>
+              </a:spcBef>
+              <a:buClr>
+                <a:schemeClr val="dk1"/>
+              </a:buClr>
+              <a:buSzPct val="25000"/>
+              <a:buFont typeface="Arial"/>
+              <a:buNone/>
+            </a:pPr>
+            <a:r>
+              <a:rPr lang="en-US" sz="1100" b="0" i="0" u="none" strike="noStrike" cap="none" dirty="0">
+                <a:solidFill>
+                  <a:schemeClr val="dk1"/>
+                </a:solidFill>
+                <a:latin typeface="Arial"/>
+                <a:ea typeface="Arial"/>
+                <a:cs typeface="Arial"/>
+                <a:sym typeface="Arial"/>
+              </a:rPr>
+              <a:t>text size bigger</a:t>
+            </a:r>
+          </a:p>
+          <a:p>
+            <a:pPr marL="0" marR="0" lvl="0" indent="0" algn="l" rtl="0">
+              <a:spcBef>
+                <a:spcPts val="0"/>
+              </a:spcBef>
+              <a:buClr>
+                <a:schemeClr val="dk1"/>
+              </a:buClr>
+              <a:buSzPct val="25000"/>
+              <a:buFont typeface="Arial"/>
+              <a:buNone/>
+            </a:pPr>
+            <a:endParaRPr lang="en-US" sz="1100" b="0" i="0" u="none" strike="noStrike" cap="none" dirty="0">
+              <a:solidFill>
+                <a:schemeClr val="dk1"/>
+              </a:solidFill>
+              <a:latin typeface="Arial"/>
+              <a:ea typeface="Arial"/>
+              <a:cs typeface="Arial"/>
+              <a:sym typeface="Arial"/>
+            </a:endParaRPr>
+          </a:p>
+          <a:p>
+            <a:pPr marL="0" marR="0" lvl="0" indent="0" algn="l" rtl="0">
+              <a:spcBef>
+                <a:spcPts val="0"/>
+              </a:spcBef>
+              <a:buClr>
+                <a:schemeClr val="dk1"/>
+              </a:buClr>
+              <a:buSzPct val="25000"/>
+              <a:buFont typeface="Arial"/>
+              <a:buNone/>
+            </a:pPr>
+            <a:r>
+              <a:rPr lang="en-US" sz="1100" b="0" i="0" u="none" strike="noStrike" cap="none" dirty="0">
+                <a:solidFill>
+                  <a:schemeClr val="dk1"/>
+                </a:solidFill>
+                <a:latin typeface="Arial"/>
+                <a:ea typeface="Arial"/>
+                <a:cs typeface="Arial"/>
+                <a:sym typeface="Arial"/>
+              </a:rPr>
+              <a:t>Go to</a:t>
+            </a:r>
+            <a:r>
+              <a:rPr lang="en-US" sz="1100" b="0" i="0" u="none" strike="noStrike" cap="none" baseline="0" dirty="0">
+                <a:solidFill>
+                  <a:schemeClr val="dk1"/>
+                </a:solidFill>
+                <a:latin typeface="Arial"/>
+                <a:ea typeface="Arial"/>
+                <a:cs typeface="Arial"/>
+                <a:sym typeface="Arial"/>
+              </a:rPr>
+              <a:t> definition</a:t>
+            </a:r>
+          </a:p>
+          <a:p>
+            <a:pPr marL="0" marR="0" lvl="0" indent="0" algn="l" rtl="0">
+              <a:spcBef>
+                <a:spcPts val="0"/>
+              </a:spcBef>
+              <a:buClr>
+                <a:schemeClr val="dk1"/>
+              </a:buClr>
+              <a:buSzPct val="25000"/>
+              <a:buFont typeface="Arial"/>
+              <a:buNone/>
+            </a:pPr>
+            <a:r>
+              <a:rPr lang="en-US" sz="1100" b="0" i="0" u="none" strike="noStrike" cap="none" baseline="0" dirty="0">
+                <a:solidFill>
+                  <a:schemeClr val="dk1"/>
+                </a:solidFill>
+                <a:latin typeface="Arial"/>
+                <a:ea typeface="Arial"/>
+                <a:cs typeface="Arial"/>
+                <a:sym typeface="Arial"/>
+              </a:rPr>
+              <a:t>Misspelled </a:t>
+            </a:r>
+            <a:r>
+              <a:rPr lang="en-US" sz="1100" b="0" i="0" u="none" strike="noStrike" cap="none" baseline="0" dirty="0" err="1">
+                <a:solidFill>
+                  <a:schemeClr val="dk1"/>
+                </a:solidFill>
+                <a:latin typeface="Arial"/>
+                <a:ea typeface="Arial"/>
+                <a:cs typeface="Arial"/>
+                <a:sym typeface="Arial"/>
+              </a:rPr>
+              <a:t>writeble</a:t>
+            </a:r>
+            <a:endParaRPr lang="en-US" sz="1100" b="0" i="0" u="none" strike="noStrike" cap="none" baseline="0" dirty="0">
+              <a:solidFill>
+                <a:schemeClr val="dk1"/>
+              </a:solidFill>
+              <a:latin typeface="Arial"/>
+              <a:ea typeface="Arial"/>
+              <a:cs typeface="Arial"/>
+              <a:sym typeface="Arial"/>
+            </a:endParaRPr>
+          </a:p>
+          <a:p>
+            <a:pPr marL="0" marR="0" lvl="0" indent="0" algn="l" rtl="0">
+              <a:spcBef>
+                <a:spcPts val="0"/>
+              </a:spcBef>
+              <a:buClr>
+                <a:schemeClr val="dk1"/>
+              </a:buClr>
+              <a:buSzPct val="25000"/>
+              <a:buFont typeface="Arial"/>
+              <a:buNone/>
+            </a:pPr>
+            <a:endParaRPr lang="en-US" sz="1100" b="0" i="0" u="none" strike="noStrike" cap="none" baseline="0" dirty="0">
+              <a:solidFill>
+                <a:schemeClr val="dk1"/>
+              </a:solidFill>
+              <a:latin typeface="Arial"/>
+              <a:ea typeface="Arial"/>
+              <a:cs typeface="Arial"/>
+              <a:sym typeface="Arial"/>
+            </a:endParaRPr>
+          </a:p>
+          <a:p>
+            <a:pPr marL="0" marR="0" lvl="0" indent="0" algn="l" rtl="0">
+              <a:spcBef>
+                <a:spcPts val="0"/>
+              </a:spcBef>
+              <a:buClr>
+                <a:schemeClr val="dk1"/>
+              </a:buClr>
+              <a:buSzPct val="25000"/>
+              <a:buFont typeface="Arial"/>
+              <a:buNone/>
+            </a:pPr>
+            <a:r>
+              <a:rPr lang="en-US" sz="1100" b="0" i="0" u="none" strike="noStrike" cap="none" baseline="0" dirty="0">
+                <a:solidFill>
+                  <a:schemeClr val="dk1"/>
+                </a:solidFill>
+                <a:latin typeface="Arial"/>
+                <a:ea typeface="Arial"/>
+                <a:cs typeface="Arial"/>
+                <a:sym typeface="Arial"/>
+              </a:rPr>
+              <a:t>What happened if it is </a:t>
+            </a:r>
+            <a:r>
+              <a:rPr lang="en-US" sz="1100" b="0" i="0" u="none" strike="noStrike" cap="none" baseline="0" dirty="0" err="1">
+                <a:solidFill>
+                  <a:schemeClr val="dk1"/>
+                </a:solidFill>
+                <a:latin typeface="Arial"/>
+                <a:ea typeface="Arial"/>
+                <a:cs typeface="Arial"/>
+                <a:sym typeface="Arial"/>
+              </a:rPr>
+              <a:t>js</a:t>
+            </a:r>
+            <a:endParaRPr lang="en-US" sz="1100" b="0" i="0" u="none" strike="noStrike" cap="none" baseline="0" dirty="0">
+              <a:solidFill>
+                <a:schemeClr val="dk1"/>
+              </a:solidFill>
+              <a:latin typeface="Arial"/>
+              <a:ea typeface="Arial"/>
+              <a:cs typeface="Arial"/>
+              <a:sym typeface="Arial"/>
+            </a:endParaRPr>
+          </a:p>
+          <a:p>
+            <a:pPr marL="0" marR="0" lvl="0" indent="0" algn="l" rtl="0">
+              <a:spcBef>
+                <a:spcPts val="0"/>
+              </a:spcBef>
+              <a:buClr>
+                <a:schemeClr val="dk1"/>
+              </a:buClr>
+              <a:buSzPct val="25000"/>
+              <a:buFont typeface="Arial"/>
+              <a:buNone/>
+            </a:pPr>
+            <a:endParaRPr lang="en-US" sz="1100" b="0" i="0" u="none" strike="noStrike" cap="none" baseline="0" dirty="0">
+              <a:solidFill>
+                <a:schemeClr val="dk1"/>
+              </a:solidFill>
+              <a:latin typeface="Arial"/>
+              <a:ea typeface="Arial"/>
+              <a:cs typeface="Arial"/>
+              <a:sym typeface="Arial"/>
+            </a:endParaRPr>
+          </a:p>
+          <a:p>
+            <a:pPr marL="0" marR="0" lvl="0" indent="0" algn="l" rtl="0">
+              <a:spcBef>
+                <a:spcPts val="0"/>
+              </a:spcBef>
+              <a:buClr>
+                <a:schemeClr val="dk1"/>
+              </a:buClr>
+              <a:buSzPct val="25000"/>
+              <a:buFont typeface="Arial"/>
+              <a:buNone/>
+            </a:pPr>
+            <a:r>
+              <a:rPr lang="en-US" sz="1100" b="0" i="0" u="none" strike="noStrike" cap="none" baseline="0" dirty="0">
+                <a:solidFill>
+                  <a:schemeClr val="dk1"/>
+                </a:solidFill>
+                <a:latin typeface="Arial"/>
+                <a:ea typeface="Arial"/>
+                <a:cs typeface="Arial"/>
+                <a:sym typeface="Arial"/>
+              </a:rPr>
+              <a:t>Show Compiler phase</a:t>
+            </a:r>
+          </a:p>
+          <a:p>
+            <a:pPr marL="0" marR="0" lvl="0" indent="0" algn="l" rtl="0">
+              <a:spcBef>
+                <a:spcPts val="0"/>
+              </a:spcBef>
+              <a:buClr>
+                <a:schemeClr val="dk1"/>
+              </a:buClr>
+              <a:buSzPct val="25000"/>
+              <a:buFont typeface="Arial"/>
+              <a:buNone/>
+            </a:pPr>
+            <a:r>
+              <a:rPr lang="en-US" sz="1100" b="0" i="0" u="none" strike="noStrike" cap="none" baseline="0" dirty="0">
+                <a:solidFill>
+                  <a:schemeClr val="dk1"/>
+                </a:solidFill>
+                <a:latin typeface="Arial"/>
+                <a:ea typeface="Arial"/>
+                <a:cs typeface="Arial"/>
+                <a:sym typeface="Arial"/>
+              </a:rPr>
+              <a:t>Explain why “any” happens</a:t>
+            </a:r>
+          </a:p>
+          <a:p>
+            <a:pPr marL="0" marR="0" lvl="0" indent="0" algn="l" rtl="0">
+              <a:spcBef>
+                <a:spcPts val="0"/>
+              </a:spcBef>
+              <a:buClr>
+                <a:schemeClr val="dk1"/>
+              </a:buClr>
+              <a:buSzPct val="25000"/>
+              <a:buFont typeface="Arial"/>
+              <a:buNone/>
+            </a:pPr>
+            <a:endParaRPr lang="en-US" sz="1100" b="0" i="0" u="none" strike="noStrike" cap="none" baseline="0" dirty="0">
+              <a:solidFill>
+                <a:schemeClr val="dk1"/>
+              </a:solidFill>
+              <a:latin typeface="Arial"/>
+              <a:ea typeface="Arial"/>
+              <a:cs typeface="Arial"/>
+              <a:sym typeface="Arial"/>
+            </a:endParaRPr>
+          </a:p>
+          <a:p>
+            <a:pPr marL="0" marR="0" lvl="0" indent="0" algn="l" rtl="0">
+              <a:spcBef>
+                <a:spcPts val="0"/>
+              </a:spcBef>
+              <a:buClr>
+                <a:schemeClr val="dk1"/>
+              </a:buClr>
+              <a:buSzPct val="25000"/>
+              <a:buFont typeface="Arial"/>
+              <a:buNone/>
+            </a:pPr>
             <a:endParaRPr sz="1100" b="0" i="0" u="none" strike="noStrike" cap="none" dirty="0">
               <a:solidFill>
                 <a:schemeClr val="dk1"/>
@@ -1249,7 +1660,199 @@
               </a:rPr>
               <a:t>Zero friction with existing javascript workflows</a:t>
             </a:r>
-            <a:endParaRPr sz="1100" b="0" i="0" u="none" strike="noStrike" cap="none" dirty="0">
+          </a:p>
+          <a:p>
+            <a:pPr marL="0" marR="0" lvl="0" indent="0" algn="l" rtl="0">
+              <a:spcBef>
+                <a:spcPts val="0"/>
+              </a:spcBef>
+              <a:buClr>
+                <a:schemeClr val="dk1"/>
+              </a:buClr>
+              <a:buSzPct val="25000"/>
+              <a:buFont typeface="Arial"/>
+              <a:buNone/>
+            </a:pPr>
+            <a:endParaRPr lang="en-US" sz="1100" b="0" i="0" u="none" strike="noStrike" cap="none" baseline="0" dirty="0">
+              <a:solidFill>
+                <a:schemeClr val="dk1"/>
+              </a:solidFill>
+              <a:latin typeface="Arial"/>
+              <a:ea typeface="Arial"/>
+              <a:cs typeface="Arial"/>
+              <a:sym typeface="Arial"/>
+            </a:endParaRPr>
+          </a:p>
+          <a:p>
+            <a:pPr marL="0" marR="0" lvl="0" indent="0" algn="l" rtl="0">
+              <a:spcBef>
+                <a:spcPts val="0"/>
+              </a:spcBef>
+              <a:buClr>
+                <a:schemeClr val="dk1"/>
+              </a:buClr>
+              <a:buSzPct val="25000"/>
+              <a:buFont typeface="Arial"/>
+              <a:buNone/>
+            </a:pPr>
+            <a:r>
+              <a:rPr lang="en-US" sz="1100" b="0" i="0" u="none" strike="noStrike" cap="none" dirty="0">
+                <a:solidFill>
+                  <a:schemeClr val="dk1"/>
+                </a:solidFill>
+                <a:latin typeface="Arial"/>
+                <a:ea typeface="Arial"/>
+                <a:cs typeface="Arial"/>
+                <a:sym typeface="Arial"/>
+              </a:rPr>
+              <a:t>might</a:t>
+            </a:r>
+            <a:r>
+              <a:rPr lang="en-US" sz="1100" b="0" i="0" u="none" strike="noStrike" cap="none" baseline="0" dirty="0">
+                <a:solidFill>
+                  <a:schemeClr val="dk1"/>
+                </a:solidFill>
+                <a:latin typeface="Arial"/>
+                <a:ea typeface="Arial"/>
+                <a:cs typeface="Arial"/>
+                <a:sym typeface="Arial"/>
+              </a:rPr>
+              <a:t> be too abstract</a:t>
+            </a:r>
+          </a:p>
+          <a:p>
+            <a:pPr marL="0" marR="0" lvl="0" indent="0" algn="l" rtl="0">
+              <a:spcBef>
+                <a:spcPts val="0"/>
+              </a:spcBef>
+              <a:buClr>
+                <a:schemeClr val="dk1"/>
+              </a:buClr>
+              <a:buSzPct val="25000"/>
+              <a:buFont typeface="Arial"/>
+              <a:buNone/>
+            </a:pPr>
+            <a:r>
+              <a:rPr lang="en-US" sz="1100" b="0" i="0" u="none" strike="noStrike" cap="none" baseline="0" dirty="0">
+                <a:solidFill>
+                  <a:schemeClr val="dk1"/>
+                </a:solidFill>
+                <a:latin typeface="Arial"/>
+                <a:ea typeface="Arial"/>
+                <a:cs typeface="Arial"/>
+                <a:sym typeface="Arial"/>
+              </a:rPr>
+              <a:t>Show in demo</a:t>
+            </a:r>
+          </a:p>
+          <a:p>
+            <a:pPr marL="0" marR="0" lvl="0" indent="0" algn="l" rtl="0">
+              <a:spcBef>
+                <a:spcPts val="0"/>
+              </a:spcBef>
+              <a:buClr>
+                <a:schemeClr val="dk1"/>
+              </a:buClr>
+              <a:buSzPct val="25000"/>
+              <a:buFont typeface="Arial"/>
+              <a:buNone/>
+            </a:pPr>
+            <a:endParaRPr lang="en-US" sz="1100" b="0" i="0" u="none" strike="noStrike" cap="none" baseline="0" dirty="0">
+              <a:solidFill>
+                <a:schemeClr val="dk1"/>
+              </a:solidFill>
+              <a:latin typeface="Arial"/>
+              <a:ea typeface="Arial"/>
+              <a:cs typeface="Arial"/>
+              <a:sym typeface="Arial"/>
+            </a:endParaRPr>
+          </a:p>
+          <a:p>
+            <a:pPr marL="0" marR="0" lvl="0" indent="0" algn="l" rtl="0">
+              <a:spcBef>
+                <a:spcPts val="0"/>
+              </a:spcBef>
+              <a:buClr>
+                <a:schemeClr val="dk1"/>
+              </a:buClr>
+              <a:buSzPct val="25000"/>
+              <a:buFont typeface="Arial"/>
+              <a:buNone/>
+            </a:pPr>
+            <a:r>
+              <a:rPr lang="en-US" sz="1100" b="0" i="0" u="none" strike="noStrike" cap="none" baseline="0" dirty="0">
+                <a:solidFill>
+                  <a:schemeClr val="dk1"/>
+                </a:solidFill>
+                <a:latin typeface="Arial"/>
+                <a:ea typeface="Arial"/>
+                <a:cs typeface="Arial"/>
+                <a:sym typeface="Arial"/>
+              </a:rPr>
+              <a:t>Compare  function </a:t>
+            </a:r>
+            <a:r>
+              <a:rPr lang="en-US" sz="1100" b="0" i="0" u="none" strike="noStrike" cap="none" baseline="0" dirty="0" err="1">
+                <a:solidFill>
+                  <a:schemeClr val="dk1"/>
+                </a:solidFill>
+                <a:latin typeface="Arial"/>
+                <a:ea typeface="Arial"/>
+                <a:cs typeface="Arial"/>
+                <a:sym typeface="Arial"/>
+              </a:rPr>
+              <a:t>sendEmail</a:t>
+            </a:r>
+            <a:r>
+              <a:rPr lang="en-US" sz="1100" b="0" i="0" u="none" strike="noStrike" cap="none" baseline="0" dirty="0">
+                <a:solidFill>
+                  <a:schemeClr val="dk1"/>
+                </a:solidFill>
+                <a:latin typeface="Arial"/>
+                <a:ea typeface="Arial"/>
+                <a:cs typeface="Arial"/>
+                <a:sym typeface="Arial"/>
+              </a:rPr>
+              <a:t>(</a:t>
+            </a:r>
+            <a:r>
+              <a:rPr lang="en-US" sz="1100" b="0" i="0" u="none" strike="noStrike" cap="none" baseline="0" dirty="0" err="1">
+                <a:solidFill>
+                  <a:schemeClr val="dk1"/>
+                </a:solidFill>
+                <a:latin typeface="Arial"/>
+                <a:ea typeface="Arial"/>
+                <a:cs typeface="Arial"/>
+                <a:sym typeface="Arial"/>
+              </a:rPr>
+              <a:t>addr</a:t>
+            </a:r>
+            <a:r>
+              <a:rPr lang="en-US" sz="1100" b="0" i="0" u="none" strike="noStrike" cap="none" baseline="0" dirty="0">
+                <a:solidFill>
+                  <a:schemeClr val="dk1"/>
+                </a:solidFill>
+                <a:latin typeface="Arial"/>
+                <a:ea typeface="Arial"/>
+                <a:cs typeface="Arial"/>
+                <a:sym typeface="Arial"/>
+              </a:rPr>
+              <a:t>)  with the modified one</a:t>
+            </a:r>
+          </a:p>
+          <a:p>
+            <a:pPr marL="0" marR="0" lvl="0" indent="0" algn="l" rtl="0">
+              <a:spcBef>
+                <a:spcPts val="0"/>
+              </a:spcBef>
+              <a:buClr>
+                <a:schemeClr val="dk1"/>
+              </a:buClr>
+              <a:buSzPct val="25000"/>
+              <a:buFont typeface="Arial"/>
+              <a:buNone/>
+            </a:pPr>
+            <a:endParaRPr lang="en-US" sz="1100" b="0" i="0" u="none" strike="noStrike" cap="none" baseline="0" dirty="0">
               <a:solidFill>
                 <a:schemeClr val="dk1"/>
               </a:solidFill>
@@ -1336,6 +1939,27 @@
             <a:r>
               <a:rPr lang="en-US" baseline="0" dirty="0"/>
               <a:t> need to change a single line of code</a:t>
+            </a:r>
+          </a:p>
+          <a:p>
+            <a:pPr lvl="0">
+              <a:spcBef>
+                <a:spcPts val="0"/>
+              </a:spcBef>
+              <a:buNone/>
+            </a:pPr>
+            <a:endParaRPr lang="en-US" baseline="0" dirty="0"/>
+          </a:p>
+          <a:p>
+            <a:pPr lvl="0">
+              <a:spcBef>
+                <a:spcPts val="0"/>
+              </a:spcBef>
+              <a:buNone/>
+            </a:pPr>
+            <a:r>
+              <a:rPr lang="en-US" baseline="0" dirty="0"/>
+              <a:t>Compile again the previous demo changing targets</a:t>
             </a:r>
             <a:endParaRPr dirty="0"/>
           </a:p>
@@ -1769,6 +2393,53 @@
             </a:pPr>
             <a:r>
               <a:rPr lang="en-US" dirty="0"/>
+              <a:t>Read</a:t>
+            </a:r>
+            <a:r>
+              <a:rPr lang="en-US" baseline="0" dirty="0"/>
+              <a:t> it out</a:t>
+            </a:r>
+          </a:p>
+          <a:p>
+            <a:pPr lvl="0">
+              <a:spcBef>
+                <a:spcPts val="0"/>
+              </a:spcBef>
+              <a:buNone/>
+            </a:pPr>
+            <a:endParaRPr lang="en-US" baseline="0" dirty="0"/>
+          </a:p>
+          <a:p>
+            <a:pPr lvl="0">
+              <a:spcBef>
+                <a:spcPts val="0"/>
+              </a:spcBef>
+              <a:buNone/>
+            </a:pPr>
+            <a:r>
+              <a:rPr lang="en-US" baseline="0" dirty="0"/>
+              <a:t>Remove the “class” to something less distracting </a:t>
+            </a:r>
+            <a:endParaRPr lang="en-US" dirty="0"/>
+          </a:p>
+          <a:p>
+            <a:pPr lvl="0">
+              <a:spcBef>
+                <a:spcPts val="0"/>
+              </a:spcBef>
+              <a:buNone/>
+            </a:pPr>
+            <a:endParaRPr lang="en-US" dirty="0"/>
+          </a:p>
+          <a:p>
+            <a:pPr lvl="0">
+              <a:spcBef>
+                <a:spcPts val="0"/>
+              </a:spcBef>
+              <a:buNone/>
+            </a:pPr>
+            <a:r>
+              <a:rPr lang="en-US" dirty="0"/>
               <a:t>Many</a:t>
             </a:r>
             <a:r>
@@ -1913,7 +2584,86 @@
               </a:spcBef>
               <a:buNone/>
             </a:pPr>
-            <a:endParaRPr dirty="0"/>
+            <a:r>
+              <a:rPr lang="en-US" dirty="0"/>
+              <a:t>Quiz format</a:t>
+            </a:r>
+            <a:r>
+              <a:rPr lang="en-US" baseline="0" dirty="0"/>
+              <a:t> from the beginning</a:t>
+            </a:r>
+          </a:p>
+          <a:p>
+            <a:pPr lvl="0">
+              <a:spcBef>
+                <a:spcPts val="0"/>
+              </a:spcBef>
+              <a:buNone/>
+            </a:pPr>
+            <a:endParaRPr lang="en-US" baseline="0" dirty="0"/>
+          </a:p>
+          <a:p>
+            <a:pPr lvl="0">
+              <a:spcBef>
+                <a:spcPts val="0"/>
+              </a:spcBef>
+              <a:buNone/>
+            </a:pPr>
+            <a:r>
+              <a:rPr lang="en-US" baseline="0" dirty="0" err="1"/>
+              <a:t>Typeof</a:t>
+            </a:r>
+            <a:r>
+              <a:rPr lang="en-US" baseline="0" dirty="0"/>
+              <a:t> === “Object”  -&gt; null</a:t>
+            </a:r>
+          </a:p>
+          <a:p>
+            <a:pPr lvl="0">
+              <a:spcBef>
+                <a:spcPts val="0"/>
+              </a:spcBef>
+              <a:buNone/>
+            </a:pPr>
+            <a:endParaRPr lang="en-US" baseline="0" dirty="0"/>
+          </a:p>
+          <a:p>
+            <a:pPr lvl="0">
+              <a:spcBef>
+                <a:spcPts val="0"/>
+              </a:spcBef>
+              <a:buNone/>
+            </a:pPr>
+            <a:r>
+              <a:rPr lang="en-US" baseline="0" dirty="0"/>
+              <a:t>Keep talking</a:t>
+            </a:r>
+          </a:p>
+          <a:p>
+            <a:pPr lvl="0">
+              <a:spcBef>
+                <a:spcPts val="0"/>
+              </a:spcBef>
+              <a:buNone/>
+            </a:pPr>
+            <a:endParaRPr lang="en-US" dirty="0"/>
+          </a:p>
+          <a:p>
+            <a:pPr lvl="0">
+              <a:spcBef>
+                <a:spcPts val="0"/>
+              </a:spcBef>
+              <a:buNone/>
+            </a:pPr>
+            <a:r>
+              <a:rPr lang="en-US" dirty="0"/>
+              <a:t>Transition part 3: what if non-built-in</a:t>
+            </a:r>
+            <a:r>
+              <a:rPr lang="en-US" baseline="0" dirty="0"/>
+              <a:t> types</a:t>
+            </a:r>
+            <a:endParaRPr lang="en-US" dirty="0"/>
           </a:p>
         </p:txBody>
       </p:sp>
@@ -2540,6 +3290,27 @@
               <a:rPr lang="en-US" baseline="0" dirty="0"/>
               <a:t>Tooling / tsserver -&gt; other platforms</a:t>
             </a:r>
+          </a:p>
+          <a:p>
+            <a:pPr lvl="0">
+              <a:spcBef>
+                <a:spcPts val="0"/>
+              </a:spcBef>
+              <a:buNone/>
+            </a:pPr>
+            <a:endParaRPr lang="en-US" baseline="0" dirty="0"/>
+          </a:p>
+          <a:p>
+            <a:pPr lvl="0">
+              <a:spcBef>
+                <a:spcPts val="0"/>
+              </a:spcBef>
+              <a:buNone/>
+            </a:pPr>
+            <a:r>
+              <a:rPr lang="en-US" baseline="0" dirty="0"/>
+              <a:t>“Created something similar” Not a fork </a:t>
+            </a:r>
             <a:endParaRPr dirty="0"/>
           </a:p>
         </p:txBody>
@@ -2767,7 +3538,161 @@
               </a:spcBef>
               <a:buNone/>
             </a:pPr>
-            <a:endParaRPr/>
+            <a:r>
+              <a:rPr lang="en-US" dirty="0"/>
+              <a:t>Angular 1.5 component</a:t>
+            </a:r>
+            <a:r>
+              <a:rPr lang="en-US" baseline="0" dirty="0"/>
+              <a:t> model</a:t>
+            </a:r>
+          </a:p>
+          <a:p>
+            <a:pPr lvl="0">
+              <a:spcBef>
+                <a:spcPts val="0"/>
+              </a:spcBef>
+              <a:buNone/>
+            </a:pPr>
+            <a:endParaRPr lang="en-US" baseline="0" dirty="0"/>
+          </a:p>
+          <a:p>
+            <a:pPr lvl="0">
+              <a:spcBef>
+                <a:spcPts val="0"/>
+              </a:spcBef>
+              <a:buNone/>
+            </a:pPr>
+            <a:r>
+              <a:rPr lang="en-US" baseline="0" dirty="0"/>
+              <a:t>Move the function and replace with constructor</a:t>
+            </a:r>
+          </a:p>
+          <a:p>
+            <a:pPr lvl="0">
+              <a:spcBef>
+                <a:spcPts val="0"/>
+              </a:spcBef>
+              <a:buNone/>
+            </a:pPr>
+            <a:endParaRPr lang="en-US" baseline="0" dirty="0"/>
+          </a:p>
+          <a:p>
+            <a:pPr lvl="0">
+              <a:spcBef>
+                <a:spcPts val="0"/>
+              </a:spcBef>
+              <a:buNone/>
+            </a:pPr>
+            <a:r>
+              <a:rPr lang="en-US" baseline="0" dirty="0"/>
+              <a:t>Remove npm install</a:t>
+            </a:r>
+          </a:p>
+          <a:p>
+            <a:pPr lvl="0">
+              <a:spcBef>
+                <a:spcPts val="0"/>
+              </a:spcBef>
+              <a:buNone/>
+            </a:pPr>
+            <a:endParaRPr lang="en-US" baseline="0" dirty="0"/>
+          </a:p>
+          <a:p>
+            <a:pPr lvl="0">
+              <a:spcBef>
+                <a:spcPts val="0"/>
+              </a:spcBef>
+              <a:buNone/>
+            </a:pPr>
+            <a:r>
+              <a:rPr lang="en-US" baseline="0" dirty="0"/>
+              <a:t>Explain “</a:t>
+            </a:r>
+            <a:r>
+              <a:rPr lang="en-US" baseline="0" dirty="0" err="1"/>
+              <a:t>tsc</a:t>
+            </a:r>
+            <a:r>
+              <a:rPr lang="en-US" baseline="0" dirty="0"/>
+              <a:t> --</a:t>
+            </a:r>
+            <a:r>
+              <a:rPr lang="en-US" baseline="0" dirty="0" err="1"/>
+              <a:t>init</a:t>
+            </a:r>
+            <a:r>
+              <a:rPr lang="en-US" baseline="0" dirty="0"/>
+              <a:t>”</a:t>
+            </a:r>
+          </a:p>
+          <a:p>
+            <a:pPr lvl="0">
+              <a:spcBef>
+                <a:spcPts val="0"/>
+              </a:spcBef>
+              <a:buNone/>
+            </a:pPr>
+            <a:endParaRPr lang="en-US" baseline="0" dirty="0"/>
+          </a:p>
+          <a:p>
+            <a:pPr lvl="0">
+              <a:spcBef>
+                <a:spcPts val="0"/>
+              </a:spcBef>
+              <a:buNone/>
+            </a:pPr>
+            <a:r>
+              <a:rPr lang="en-US" baseline="0" dirty="0"/>
+              <a:t>Watch mode</a:t>
+            </a:r>
+          </a:p>
+          <a:p>
+            <a:pPr lvl="0">
+              <a:spcBef>
+                <a:spcPts val="0"/>
+              </a:spcBef>
+              <a:buNone/>
+            </a:pPr>
+            <a:endParaRPr lang="en-US" baseline="0" dirty="0"/>
+          </a:p>
+          <a:p>
+            <a:pPr lvl="0">
+              <a:spcBef>
+                <a:spcPts val="0"/>
+              </a:spcBef>
+              <a:buNone/>
+            </a:pPr>
+            <a:r>
+              <a:rPr lang="en-US" baseline="0" dirty="0"/>
+              <a:t>Property (you don’t misspell)</a:t>
+            </a:r>
+          </a:p>
+          <a:p>
+            <a:pPr lvl="0">
+              <a:spcBef>
+                <a:spcPts val="0"/>
+              </a:spcBef>
+              <a:buNone/>
+            </a:pPr>
+            <a:endParaRPr lang="en-US" baseline="0" dirty="0"/>
+          </a:p>
+          <a:p>
+            <a:pPr lvl="0">
+              <a:spcBef>
+                <a:spcPts val="0"/>
+              </a:spcBef>
+              <a:buNone/>
+            </a:pPr>
+            <a:r>
+              <a:rPr lang="en-US" dirty="0"/>
+              <a:t>Careful</a:t>
+            </a:r>
+            <a:r>
+              <a:rPr lang="en-US" baseline="0" dirty="0"/>
+              <a:t> about wording “you don’t ever need to xxx in TypeScript”</a:t>
+            </a:r>
+            <a:endParaRPr dirty="0"/>
           </a:p>
         </p:txBody>
       </p:sp>
@@ -3464,7 +4389,81 @@
               <a:rPr lang="en-US" baseline="0" dirty="0"/>
               <a:t>No longer need another tool to get the type definition files, npm is all you needed.</a:t>
             </a:r>
-            <a:endParaRPr dirty="0"/>
+          </a:p>
+          <a:p>
+            <a:pPr lvl="0">
+              <a:spcBef>
+                <a:spcPts val="0"/>
+              </a:spcBef>
+              <a:buNone/>
+            </a:pPr>
+            <a:endParaRPr lang="en-US" baseline="0" dirty="0"/>
+          </a:p>
+          <a:p>
+            <a:pPr lvl="0">
+              <a:spcBef>
+                <a:spcPts val="0"/>
+              </a:spcBef>
+              <a:buNone/>
+            </a:pPr>
+            <a:r>
+              <a:rPr lang="en-US" dirty="0"/>
+              <a:t>No go in too much details about </a:t>
+            </a:r>
+            <a:r>
+              <a:rPr lang="en-US" dirty="0" err="1"/>
+              <a:t>tsd</a:t>
+            </a:r>
+            <a:r>
+              <a:rPr lang="en-US" dirty="0"/>
+              <a:t> and typings</a:t>
+            </a:r>
+          </a:p>
+          <a:p>
+            <a:pPr lvl="0">
+              <a:spcBef>
+                <a:spcPts val="0"/>
+              </a:spcBef>
+              <a:buNone/>
+            </a:pPr>
+            <a:r>
+              <a:rPr lang="en-US" dirty="0"/>
+              <a:t>Npm command </a:t>
+            </a:r>
+            <a:r>
+              <a:rPr lang="en-US" dirty="0" err="1"/>
+              <a:t>Showup</a:t>
+            </a:r>
+            <a:r>
+              <a:rPr lang="en-US" dirty="0"/>
+              <a:t> after</a:t>
+            </a:r>
+            <a:r>
+              <a:rPr lang="en-US" baseline="0" dirty="0"/>
+              <a:t> some talking</a:t>
+            </a:r>
+          </a:p>
+          <a:p>
+            <a:pPr lvl="0">
+              <a:spcBef>
+                <a:spcPts val="0"/>
+              </a:spcBef>
+              <a:buNone/>
+            </a:pPr>
+            <a:endParaRPr lang="en-US" baseline="0" dirty="0"/>
+          </a:p>
+          <a:p>
+            <a:pPr lvl="0">
+              <a:spcBef>
+                <a:spcPts val="0"/>
+              </a:spcBef>
+              <a:buNone/>
+            </a:pPr>
+            <a:r>
+              <a:rPr lang="en-US" baseline="0" dirty="0"/>
+              <a:t>Remove text</a:t>
+            </a:r>
+            <a:endParaRPr lang="en-US" dirty="0"/>
           </a:p>
         </p:txBody>
       </p:sp>
@@ -3565,7 +4564,11 @@
               </a:spcBef>
               <a:buNone/>
             </a:pPr>
-            <a:endParaRPr/>
+            <a:r>
+              <a:rPr lang="en-US" dirty="0"/>
+              <a:t>Go to definition</a:t>
+            </a:r>
+            <a:endParaRPr dirty="0"/>
           </a:p>
         </p:txBody>
       </p:sp>
@@ -3738,6 +4741,126 @@
               </a:rPr>
               <a:t>Might not always be in sync with the latest library.</a:t>
             </a:r>
+          </a:p>
+          <a:p>
+            <a:pPr marL="0" marR="0" lvl="0" indent="0" algn="l" rtl="0">
+              <a:spcBef>
+                <a:spcPts val="0"/>
+              </a:spcBef>
+              <a:buClr>
+                <a:schemeClr val="dk1"/>
+              </a:buClr>
+              <a:buSzPct val="25000"/>
+              <a:buFont typeface="Arial"/>
+              <a:buNone/>
+            </a:pPr>
+            <a:endParaRPr lang="en-US" sz="1100" b="0" i="0" u="none" strike="noStrike" cap="none" dirty="0">
+              <a:solidFill>
+                <a:schemeClr val="dk1"/>
+              </a:solidFill>
+              <a:latin typeface="Arial"/>
+              <a:ea typeface="Arial"/>
+              <a:cs typeface="Arial"/>
+              <a:sym typeface="Arial"/>
+            </a:endParaRPr>
+          </a:p>
+          <a:p>
+            <a:pPr marL="0" marR="0" lvl="0" indent="0" algn="l" rtl="0">
+              <a:spcBef>
+                <a:spcPts val="0"/>
+              </a:spcBef>
+              <a:buClr>
+                <a:schemeClr val="dk1"/>
+              </a:buClr>
+              <a:buSzPct val="25000"/>
+              <a:buFont typeface="Arial"/>
+              <a:buNone/>
+            </a:pPr>
+            <a:r>
+              <a:rPr lang="en-US" sz="1100" b="0" i="0" u="none" strike="noStrike" cap="none" dirty="0" err="1">
+                <a:solidFill>
+                  <a:schemeClr val="dk1"/>
+                </a:solidFill>
+                <a:latin typeface="Arial"/>
+                <a:ea typeface="Arial"/>
+                <a:cs typeface="Arial"/>
+                <a:sym typeface="Arial"/>
+              </a:rPr>
+              <a:t>d.Ts</a:t>
+            </a:r>
+            <a:r>
+              <a:rPr lang="en-US" sz="1100" b="0" i="0" u="none" strike="noStrike" cap="none" dirty="0">
+                <a:solidFill>
+                  <a:schemeClr val="dk1"/>
+                </a:solidFill>
+                <a:latin typeface="Arial"/>
+                <a:ea typeface="Arial"/>
+                <a:cs typeface="Arial"/>
+                <a:sym typeface="Arial"/>
+              </a:rPr>
+              <a:t> files</a:t>
+            </a:r>
+            <a:r>
+              <a:rPr lang="en-US" sz="1100" b="0" i="0" u="none" strike="noStrike" cap="none" baseline="0" dirty="0">
+                <a:solidFill>
+                  <a:schemeClr val="dk1"/>
+                </a:solidFill>
+                <a:latin typeface="Arial"/>
+                <a:ea typeface="Arial"/>
+                <a:cs typeface="Arial"/>
+                <a:sym typeface="Arial"/>
+              </a:rPr>
+              <a:t> powers </a:t>
+            </a:r>
+            <a:r>
+              <a:rPr lang="en-US" sz="1100" b="0" i="0" u="none" strike="noStrike" cap="none" baseline="0" dirty="0" err="1">
+                <a:solidFill>
+                  <a:schemeClr val="dk1"/>
+                </a:solidFill>
+                <a:latin typeface="Arial"/>
+                <a:ea typeface="Arial"/>
+                <a:cs typeface="Arial"/>
+                <a:sym typeface="Arial"/>
+              </a:rPr>
+              <a:t>js</a:t>
+            </a:r>
+            <a:r>
+              <a:rPr lang="en-US" sz="1100" b="0" i="0" u="none" strike="noStrike" cap="none" baseline="0" dirty="0">
+                <a:solidFill>
+                  <a:schemeClr val="dk1"/>
+                </a:solidFill>
+                <a:latin typeface="Arial"/>
+                <a:ea typeface="Arial"/>
+                <a:cs typeface="Arial"/>
+                <a:sym typeface="Arial"/>
+              </a:rPr>
+              <a:t> developers as well</a:t>
+            </a:r>
+          </a:p>
+          <a:p>
+            <a:pPr marL="0" marR="0" lvl="0" indent="0" algn="l" rtl="0">
+              <a:spcBef>
+                <a:spcPts val="0"/>
+              </a:spcBef>
+              <a:buClr>
+                <a:schemeClr val="dk1"/>
+              </a:buClr>
+              <a:buSzPct val="25000"/>
+              <a:buFont typeface="Arial"/>
+              <a:buNone/>
+            </a:pPr>
+            <a:r>
+              <a:rPr lang="en-US" sz="1100" b="0" i="0" u="none" strike="noStrike" cap="none" baseline="0" dirty="0">
+                <a:solidFill>
+                  <a:schemeClr val="dk1"/>
+                </a:solidFill>
+                <a:latin typeface="Arial"/>
+                <a:ea typeface="Arial"/>
+                <a:cs typeface="Arial"/>
+                <a:sym typeface="Arial"/>
+              </a:rPr>
+              <a:t>Benefits millions </a:t>
+            </a:r>
             <a:endParaRPr sz="1100" b="0" i="0" u="none" strike="noStrike" cap="none" dirty="0">
               <a:solidFill>
                 <a:schemeClr val="dk1"/>
@@ -4085,13 +5208,51 @@
             </a:r>
             <a:r>
               <a:rPr lang="en-US" baseline="0" dirty="0"/>
-              <a:t> short </a:t>
+              <a:t> short release cycle </a:t>
             </a:r>
+          </a:p>
+          <a:p>
+            <a:pPr lvl="0">
+              <a:spcBef>
+                <a:spcPts val="0"/>
+              </a:spcBef>
+              <a:buNone/>
+            </a:pPr>
+            <a:endParaRPr lang="en-US" baseline="0" dirty="0"/>
+          </a:p>
+          <a:p>
+            <a:pPr lvl="0">
+              <a:spcBef>
+                <a:spcPts val="0"/>
+              </a:spcBef>
+              <a:buNone/>
+            </a:pPr>
             <a:r>
-              <a:rPr lang="en-US" baseline="0"/>
-              <a:t>release cycle </a:t>
+              <a:rPr lang="en-US" baseline="0" dirty="0"/>
+              <a:t>2.1</a:t>
             </a:r>
-            <a:endParaRPr/>
+          </a:p>
+          <a:p>
+            <a:pPr lvl="0">
+              <a:spcBef>
+                <a:spcPts val="0"/>
+              </a:spcBef>
+              <a:buNone/>
+            </a:pPr>
+            <a:endParaRPr lang="en-US" baseline="0" dirty="0"/>
+          </a:p>
+          <a:p>
+            <a:pPr lvl="0">
+              <a:spcBef>
+                <a:spcPts val="0"/>
+              </a:spcBef>
+              <a:buNone/>
+            </a:pPr>
+            <a:r>
+              <a:rPr lang="en-US" dirty="0"/>
+              <a:t>“Constant Innovation”</a:t>
+            </a:r>
+            <a:endParaRPr dirty="0"/>
           </a:p>
         </p:txBody>
       </p:sp>
@@ -4435,7 +5596,61 @@
               </a:spcBef>
               <a:buNone/>
             </a:pPr>
-            <a:endParaRPr/>
+            <a:r>
+              <a:rPr lang="en-US" dirty="0"/>
+              <a:t>Mention it</a:t>
+            </a:r>
+            <a:r>
+              <a:rPr lang="en-US" baseline="0" dirty="0"/>
+              <a:t> is tough to </a:t>
+            </a:r>
+          </a:p>
+          <a:p>
+            <a:pPr lvl="0" rtl="0">
+              <a:spcBef>
+                <a:spcPts val="0"/>
+              </a:spcBef>
+              <a:buNone/>
+            </a:pPr>
+            <a:endParaRPr lang="en-US" baseline="0" dirty="0"/>
+          </a:p>
+          <a:p>
+            <a:pPr lvl="0" rtl="0">
+              <a:spcBef>
+                <a:spcPts val="0"/>
+              </a:spcBef>
+              <a:buNone/>
+            </a:pPr>
+            <a:r>
+              <a:rPr lang="en-US" baseline="0" dirty="0"/>
+              <a:t>Come back to Angular</a:t>
+            </a:r>
+          </a:p>
+          <a:p>
+            <a:pPr lvl="0" rtl="0">
+              <a:spcBef>
+                <a:spcPts val="0"/>
+              </a:spcBef>
+              <a:buNone/>
+            </a:pPr>
+            <a:endParaRPr lang="en-US" dirty="0"/>
+          </a:p>
+          <a:p>
+            <a:pPr lvl="0" rtl="0">
+              <a:spcBef>
+                <a:spcPts val="0"/>
+              </a:spcBef>
+              <a:buNone/>
+            </a:pPr>
+            <a:r>
+              <a:rPr lang="en-US" dirty="0"/>
+              <a:t>Async</a:t>
+            </a:r>
+            <a:r>
+              <a:rPr lang="en-US" baseline="0" dirty="0"/>
+              <a:t> await / promise side by side</a:t>
+            </a:r>
+            <a:endParaRPr dirty="0"/>
           </a:p>
         </p:txBody>
       </p:sp>
@@ -4664,7 +5879,19 @@
               </a:spcBef>
               <a:buNone/>
             </a:pPr>
-            <a:endParaRPr/>
+            <a:r>
+              <a:rPr lang="en-US" dirty="0"/>
+              <a:t>More emphasis on “Why TypeScript”</a:t>
+            </a:r>
+          </a:p>
+          <a:p>
+            <a:pPr lvl="0">
+              <a:spcBef>
+                <a:spcPts val="0"/>
+              </a:spcBef>
+              <a:buNone/>
+            </a:pPr>
+            <a:endParaRPr dirty="0"/>
           </a:p>
         </p:txBody>
       </p:sp>
@@ -4765,6 +5992,55 @@
               </a:spcBef>
               <a:buNone/>
             </a:pPr>
+            <a:r>
+              <a:rPr lang="en-US" dirty="0"/>
+              <a:t>Me specifically</a:t>
+            </a:r>
+          </a:p>
+          <a:p>
+            <a:pPr lvl="0">
+              <a:spcBef>
+                <a:spcPts val="0"/>
+              </a:spcBef>
+              <a:buNone/>
+            </a:pPr>
+            <a:r>
+              <a:rPr lang="en-US" dirty="0"/>
+              <a:t>Pause for a while</a:t>
+            </a:r>
+          </a:p>
+          <a:p>
+            <a:pPr lvl="0">
+              <a:spcBef>
+                <a:spcPts val="0"/>
+              </a:spcBef>
+              <a:buNone/>
+            </a:pPr>
+            <a:endParaRPr lang="en-US" dirty="0"/>
+          </a:p>
+          <a:p>
+            <a:pPr lvl="0">
+              <a:spcBef>
+                <a:spcPts val="0"/>
+              </a:spcBef>
+              <a:buNone/>
+            </a:pPr>
+            <a:r>
+              <a:rPr lang="en-US" dirty="0"/>
+              <a:t>“Anything we can</a:t>
+            </a:r>
+            <a:r>
+              <a:rPr lang="en-US" baseline="0" dirty="0"/>
+              <a:t> </a:t>
+            </a:r>
+            <a:r>
+              <a:rPr lang="en-US" baseline="0"/>
+              <a:t>help with</a:t>
+            </a:r>
+            <a:r>
+              <a:rPr lang="en-US"/>
+              <a:t>”</a:t>
+            </a:r>
             <a:endParaRPr/>
           </a:p>
         </p:txBody>
@@ -5753,6 +7029,46 @@
             <a:r>
               <a:rPr lang="en-US" baseline="0" dirty="0" err="1"/>
               <a:t>compatability</a:t>
+            </a:r>
+            <a:endParaRPr lang="en-US" baseline="0" dirty="0"/>
+          </a:p>
+          <a:p>
+            <a:pPr lvl="0">
+              <a:spcBef>
+                <a:spcPts val="0"/>
+              </a:spcBef>
+              <a:buNone/>
+            </a:pPr>
+            <a:endParaRPr lang="en-US" baseline="0" dirty="0"/>
+          </a:p>
+          <a:p>
+            <a:pPr lvl="0">
+              <a:spcBef>
+                <a:spcPts val="0"/>
+              </a:spcBef>
+              <a:buNone/>
+            </a:pPr>
+            <a:endParaRPr lang="en-US" baseline="0" dirty="0"/>
+          </a:p>
+          <a:p>
+            <a:pPr lvl="0">
+              <a:spcBef>
+                <a:spcPts val="0"/>
+              </a:spcBef>
+              <a:buNone/>
+            </a:pPr>
+            <a:endParaRPr lang="en-US" baseline="0" dirty="0"/>
+          </a:p>
+          <a:p>
+            <a:pPr lvl="0">
+              <a:spcBef>
+                <a:spcPts val="0"/>
+              </a:spcBef>
+              <a:buNone/>
+            </a:pPr>
+            <a:r>
+              <a:rPr lang="en-US" baseline="0" dirty="0"/>
+              <a:t>Animation</a:t>
             </a:r>
             <a:endParaRPr dirty="0"/>
           </a:p>
@@ -18098,7 +19414,7 @@
               <a:buNone/>
             </a:pPr>
             <a:r>
-              <a:rPr lang="en-US" sz="2800" b="1" i="0" u="none" strike="noStrike" cap="none">
+              <a:rPr lang="en-US" sz="2800" b="1" i="0" u="none" strike="noStrike" cap="none" dirty="0" err="1">
                 <a:solidFill>
                   <a:srgbClr val="435B67"/>
                 </a:solidFill>
@@ -18107,7 +19423,19 @@
                 <a:cs typeface="Roboto"/>
                 <a:sym typeface="Roboto"/>
               </a:rPr>
-              <a:t>Downlevel Compilation</a:t>
+              <a:t>Downlevel</a:t>
+            </a:r>
+            <a:r>
+              <a:rPr lang="en-US" sz="2800" b="1" i="0" u="none" strike="noStrike" cap="none" dirty="0">
+                <a:solidFill>
+                  <a:srgbClr val="435B67"/>
+                </a:solidFill>
+                <a:latin typeface="Roboto"/>
+                <a:ea typeface="Roboto"/>
+                <a:cs typeface="Roboto"/>
+                <a:sym typeface="Roboto"/>
+              </a:rPr>
+              <a:t> Compilation</a:t>
             </a:r>
           </a:p>
         </p:txBody>
@@ -22175,6 +23503,58 @@
 </file>
 
 <file path=ppt/slides/slide20.xml><?xml version="1.0" encoding="utf-8"?>
+<p:sld xmlns:a="http://schemas.openxmlformats.org/drawingml/2006/main" xmlns:r="http://schemas.openxmlformats.org/officeDocument/2006/relationships" xmlns:p="http://schemas.openxmlformats.org/presentationml/2006/main">
+  <p:cSld>
+    <p:spTree>
+      <p:nvGrpSpPr>
+        <p:cNvPr id="1" name=""/>
+        <p:cNvGrpSpPr/>
+        <p:nvPr/>
+      </p:nvGrpSpPr>
+      <p:grpSpPr>
+        <a:xfrm>
+          <a:off x="0" y="0"/>
+          <a:ext cx="0" cy="0"/>
+          <a:chOff x="0" y="0"/>
+          <a:chExt cx="0" cy="0"/>
+        </a:xfrm>
+      </p:grpSpPr>
+      <p:sp>
+        <p:nvSpPr>
+          <p:cNvPr id="2" name="Text Placeholder 1"/>
+          <p:cNvSpPr>
+            <a:spLocks noGrp="1"/>
+          </p:cNvSpPr>
+          <p:nvPr>
+            <p:ph type="body" idx="1"/>
+          </p:nvPr>
+        </p:nvSpPr>
+        <p:spPr/>
+        <p:txBody>
+          <a:bodyPr/>
+          <a:lstStyle/>
+          <a:p>
+            <a:r>
+              <a:rPr lang="en-US" dirty="0"/>
+              <a:t>&lt;History&gt;</a:t>
+            </a:r>
+          </a:p>
+        </p:txBody>
+      </p:sp>
+    </p:spTree>
+    <p:extLst>
+      <p:ext uri="{BB962C8B-B14F-4D97-AF65-F5344CB8AC3E}">
+        <p14:creationId xmlns:p14="http://schemas.microsoft.com/office/powerpoint/2010/main" val="2377279275"/>
+      </p:ext>
+    </p:extLst>
+  </p:cSld>
+  <p:clrMapOvr>
+    <a:masterClrMapping/>
+  </p:clrMapOvr>
+</p:sld>
+</file>
+
+<file path=ppt/slides/slide21.xml><?xml version="1.0" encoding="utf-8"?>
 <p:sld xmlns:a="http://schemas.openxmlformats.org/drawingml/2006/main" xmlns:r="http://schemas.openxmlformats.org/officeDocument/2006/relationships" xmlns:p="http://schemas.openxmlformats.org/presentationml/2006/main">
   <p:cSld>
     <p:spTree>
@@ -22425,7 +23805,7 @@
 </p:sld>
 </file>
 
-<file path=ppt/slides/slide21.xml><?xml version="1.0" encoding="utf-8"?>
+<file path=ppt/slides/slide22.xml><?xml version="1.0" encoding="utf-8"?>
 <p:sld xmlns:a="http://schemas.openxmlformats.org/drawingml/2006/main" xmlns:r="http://schemas.openxmlformats.org/officeDocument/2006/relationships" xmlns:p="http://schemas.openxmlformats.org/presentationml/2006/main">
   <p:cSld>
     <p:spTree>
@@ -22819,7 +24199,7 @@
 </p:sld>
 </file>
 
-<file path=ppt/slides/slide22.xml><?xml version="1.0" encoding="utf-8"?>
+<file path=ppt/slides/slide23.xml><?xml version="1.0" encoding="utf-8"?>
 <p:sld xmlns:a="http://schemas.openxmlformats.org/drawingml/2006/main" xmlns:r="http://schemas.openxmlformats.org/officeDocument/2006/relationships" xmlns:p="http://schemas.openxmlformats.org/presentationml/2006/main">
   <p:cSld>
     <p:spTree>
@@ -22932,7 +24312,7 @@
 </p:sld>
 </file>
 
-<file path=ppt/slides/slide23.xml><?xml version="1.0" encoding="utf-8"?>
+<file path=ppt/slides/slide24.xml><?xml version="1.0" encoding="utf-8"?>
 <p:sld xmlns:a="http://schemas.openxmlformats.org/drawingml/2006/main" xmlns:r="http://schemas.openxmlformats.org/officeDocument/2006/relationships" xmlns:p="http://schemas.openxmlformats.org/presentationml/2006/main">
   <p:cSld>
     <p:spTree>
@@ -23245,7 +24625,7 @@
 </p:sld>
 </file>
 
-<file path=ppt/slides/slide24.xml><?xml version="1.0" encoding="utf-8"?>
+<file path=ppt/slides/slide25.xml><?xml version="1.0" encoding="utf-8"?>
 <p:sld xmlns:a="http://schemas.openxmlformats.org/drawingml/2006/main" xmlns:r="http://schemas.openxmlformats.org/officeDocument/2006/relationships" xmlns:p="http://schemas.openxmlformats.org/presentationml/2006/main">
   <p:cSld>
     <p:spTree>
@@ -23330,7 +24710,7 @@
 </p:sld>
 </file>
 
-<file path=ppt/slides/slide25.xml><?xml version="1.0" encoding="utf-8"?>
+<file path=ppt/slides/slide26.xml><?xml version="1.0" encoding="utf-8"?>
 <p:sld xmlns:a="http://schemas.openxmlformats.org/drawingml/2006/main" xmlns:r="http://schemas.openxmlformats.org/officeDocument/2006/relationships" xmlns:p="http://schemas.openxmlformats.org/presentationml/2006/main">
   <p:cSld>
     <p:spTree>
@@ -23443,7 +24823,7 @@
 </p:sld>
 </file>
 
-<file path=ppt/slides/slide26.xml><?xml version="1.0" encoding="utf-8"?>
+<file path=ppt/slides/slide27.xml><?xml version="1.0" encoding="utf-8"?>
 <p:sld xmlns:a="http://schemas.openxmlformats.org/drawingml/2006/main" xmlns:r="http://schemas.openxmlformats.org/officeDocument/2006/relationships" xmlns:p="http://schemas.openxmlformats.org/presentationml/2006/main">
   <p:cSld>
     <p:spTree>
@@ -23764,7 +25144,7 @@
 </p:sld>
 </file>
 
-<file path=ppt/slides/slide27.xml><?xml version="1.0" encoding="utf-8"?>
+<file path=ppt/slides/slide28.xml><?xml version="1.0" encoding="utf-8"?>
 <p:sld xmlns:a="http://schemas.openxmlformats.org/drawingml/2006/main" xmlns:r="http://schemas.openxmlformats.org/officeDocument/2006/relationships" xmlns:p="http://schemas.openxmlformats.org/presentationml/2006/main">
   <p:cSld>
     <p:spTree>
@@ -24418,7 +25798,7 @@
                   <a:buNone/>
                 </a:pPr>
                 <a:r>
-                  <a:rPr lang="en-US" sz="1400" b="0" i="0" u="none" strike="noStrike" cap="none">
+                  <a:rPr lang="en-US" sz="1400" b="0" i="0" u="none" strike="noStrike" cap="none" dirty="0">
                     <a:solidFill>
                       <a:srgbClr val="505050"/>
                     </a:solidFill>
@@ -24449,7 +25829,7 @@
                   <a:buNone/>
                 </a:pPr>
                 <a:r>
-                  <a:rPr lang="en-US" sz="1400" b="0" i="0" u="none" strike="noStrike" cap="none">
+                  <a:rPr lang="en-US" sz="1400" b="0" i="0" u="none" strike="noStrike" cap="none" dirty="0">
                     <a:solidFill>
                       <a:srgbClr val="505050"/>
                     </a:solidFill>
@@ -24458,7 +25838,31 @@
                     <a:cs typeface="Quattrocento Sans"/>
                     <a:sym typeface="Quattrocento Sans"/>
                   </a:rPr>
-                  <a:t>.d.ts files from DT</a:t>
+                  <a:t>.</a:t>
+                </a:r>
+                <a:r>
+                  <a:rPr lang="en-US" sz="1400" b="0" i="0" u="none" strike="noStrike" cap="none" dirty="0" err="1">
+                    <a:solidFill>
+                      <a:srgbClr val="505050"/>
+                    </a:solidFill>
+                    <a:latin typeface="Quattrocento Sans"/>
+                    <a:ea typeface="Quattrocento Sans"/>
+                    <a:cs typeface="Quattrocento Sans"/>
+                    <a:sym typeface="Quattrocento Sans"/>
+                  </a:rPr>
+                  <a:t>d.ts</a:t>
+                </a:r>
+                <a:r>
+                  <a:rPr lang="en-US" sz="1400" b="0" i="0" u="none" strike="noStrike" cap="none" dirty="0">
+                    <a:solidFill>
+                      <a:srgbClr val="505050"/>
+                    </a:solidFill>
+                    <a:latin typeface="Quattrocento Sans"/>
+                    <a:ea typeface="Quattrocento Sans"/>
+                    <a:cs typeface="Quattrocento Sans"/>
+                    <a:sym typeface="Quattrocento Sans"/>
+                  </a:rPr>
+                  <a:t> files from DT</a:t>
                 </a:r>
               </a:p>
             </p:txBody>
@@ -24665,7 +26069,7 @@
                   <a:buNone/>
                 </a:pPr>
                 <a:r>
-                  <a:rPr lang="en-US" sz="1400" b="0" i="0" u="none" strike="noStrike" cap="none">
+                  <a:rPr lang="en-US" sz="1400" b="0" i="0" u="none" strike="noStrike" cap="none" dirty="0">
                     <a:solidFill>
                       <a:srgbClr val="505050"/>
                     </a:solidFill>
@@ -24674,7 +26078,31 @@
                     <a:cs typeface="Quattrocento Sans"/>
                     <a:sym typeface="Quattrocento Sans"/>
                   </a:rPr>
-                  <a:t>.d.ts registry and</a:t>
+                  <a:t>.</a:t>
+                </a:r>
+                <a:r>
+                  <a:rPr lang="en-US" sz="1400" b="0" i="0" u="none" strike="noStrike" cap="none" dirty="0" err="1">
+                    <a:solidFill>
+                      <a:srgbClr val="505050"/>
+                    </a:solidFill>
+                    <a:latin typeface="Quattrocento Sans"/>
+                    <a:ea typeface="Quattrocento Sans"/>
+                    <a:cs typeface="Quattrocento Sans"/>
+                    <a:sym typeface="Quattrocento Sans"/>
+                  </a:rPr>
+                  <a:t>d.ts</a:t>
+                </a:r>
+                <a:r>
+                  <a:rPr lang="en-US" sz="1400" b="0" i="0" u="none" strike="noStrike" cap="none" dirty="0">
+                    <a:solidFill>
+                      <a:srgbClr val="505050"/>
+                    </a:solidFill>
+                    <a:latin typeface="Quattrocento Sans"/>
+                    <a:ea typeface="Quattrocento Sans"/>
+                    <a:cs typeface="Quattrocento Sans"/>
+                    <a:sym typeface="Quattrocento Sans"/>
+                  </a:rPr>
+                  <a:t> registry and</a:t>
                 </a:r>
               </a:p>
               <a:p>
@@ -24696,7 +26124,7 @@
                   <a:buNone/>
                 </a:pPr>
                 <a:r>
-                  <a:rPr lang="en-US" sz="1400" b="0" i="0" u="none" strike="noStrike" cap="none">
+                  <a:rPr lang="en-US" sz="1400" b="0" i="0" u="none" strike="noStrike" cap="none" dirty="0">
                     <a:solidFill>
                       <a:srgbClr val="505050"/>
                     </a:solidFill>
@@ -25028,7 +26456,7 @@
               <a:buNone/>
             </a:pPr>
             <a:r>
-              <a:rPr lang="en-US" sz="2400" b="0" i="0" u="none" strike="noStrike" cap="none">
+              <a:rPr lang="en-US" sz="2400" b="0" i="0" u="none" strike="noStrike" cap="none" dirty="0">
                 <a:solidFill>
                   <a:srgbClr val="000000"/>
                 </a:solidFill>
@@ -25050,7 +26478,7 @@
 </p:sld>
 </file>
 
-<file path=ppt/slides/slide28.xml><?xml version="1.0" encoding="utf-8"?>
+<file path=ppt/slides/slide29.xml><?xml version="1.0" encoding="utf-8"?>
 <p:sld xmlns:a="http://schemas.openxmlformats.org/drawingml/2006/main" xmlns:r="http://schemas.openxmlformats.org/officeDocument/2006/relationships" xmlns:p="http://schemas.openxmlformats.org/presentationml/2006/main">
   <p:cSld>
     <p:spTree>
@@ -25151,325 +26579,6 @@
                 <a:sym typeface="Roboto"/>
               </a:rPr>
               <a:t>Type acquisition</a:t>
-            </a:r>
-          </a:p>
-        </p:txBody>
-      </p:sp>
-    </p:spTree>
-  </p:cSld>
-  <p:clrMapOvr>
-    <a:masterClrMapping/>
-  </p:clrMapOvr>
-</p:sld>
-</file>
-
-<file path=ppt/slides/slide29.xml><?xml version="1.0" encoding="utf-8"?>
-<p:sld xmlns:a="http://schemas.openxmlformats.org/drawingml/2006/main" xmlns:r="http://schemas.openxmlformats.org/officeDocument/2006/relationships" xmlns:p="http://schemas.openxmlformats.org/presentationml/2006/main">
-  <p:cSld>
-    <p:spTree>
-      <p:nvGrpSpPr>
-        <p:cNvPr id="1" name="Shape 391"/>
-        <p:cNvGrpSpPr/>
-        <p:nvPr/>
-      </p:nvGrpSpPr>
-      <p:grpSpPr>
-        <a:xfrm>
-          <a:off x="0" y="0"/>
-          <a:ext cx="0" cy="0"/>
-          <a:chOff x="0" y="0"/>
-          <a:chExt cx="0" cy="0"/>
-        </a:xfrm>
-      </p:grpSpPr>
-      <p:sp>
-        <p:nvSpPr>
-          <p:cNvPr id="392" name="Shape 392"/>
-          <p:cNvSpPr txBox="1">
-            <a:spLocks noGrp="1"/>
-          </p:cNvSpPr>
-          <p:nvPr>
-            <p:ph type="body" idx="1"/>
-          </p:nvPr>
-        </p:nvSpPr>
-        <p:spPr>
-          <a:xfrm>
-            <a:off x="2818775" y="178081"/>
-            <a:ext cx="5772000" cy="3992105"/>
-          </a:xfrm>
-          <a:prstGeom prst="rect">
-            <a:avLst/>
-          </a:prstGeom>
-          <a:noFill/>
-          <a:ln>
-            <a:noFill/>
-          </a:ln>
-        </p:spPr>
-        <p:txBody>
-          <a:bodyPr lIns="91425" tIns="91425" rIns="91425" bIns="91425" anchor="t" anchorCtr="0">
-            <a:noAutofit/>
-          </a:bodyPr>
-          <a:lstStyle/>
-          <a:p>
-            <a:pPr marL="0" marR="0" lvl="0" indent="0" algn="ctr" rtl="0">
-              <a:lnSpc>
-                <a:spcPct val="115000"/>
-              </a:lnSpc>
-              <a:spcBef>
-                <a:spcPts val="0"/>
-              </a:spcBef>
-              <a:spcAft>
-                <a:spcPts val="0"/>
-              </a:spcAft>
-              <a:buClr>
-                <a:srgbClr val="5D6ABF"/>
-              </a:buClr>
-              <a:buSzPct val="25000"/>
-              <a:buFont typeface="Roboto"/>
-              <a:buNone/>
-            </a:pPr>
-            <a:r>
-              <a:rPr lang="en-US" sz="2400" b="1" i="0" u="none" strike="noStrike" cap="none">
-                <a:solidFill>
-                  <a:srgbClr val="435B67"/>
-                </a:solidFill>
-                <a:latin typeface="Roboto"/>
-                <a:ea typeface="Roboto"/>
-                <a:cs typeface="Roboto"/>
-                <a:sym typeface="Roboto"/>
-              </a:rPr>
-              <a:t>Type Acquisition</a:t>
-            </a:r>
-          </a:p>
-          <a:p>
-            <a:pPr marL="0" marR="0" lvl="0" indent="0" algn="ctr" rtl="0">
-              <a:lnSpc>
-                <a:spcPct val="115000"/>
-              </a:lnSpc>
-              <a:spcBef>
-                <a:spcPts val="0"/>
-              </a:spcBef>
-              <a:spcAft>
-                <a:spcPts val="0"/>
-              </a:spcAft>
-              <a:buClr>
-                <a:srgbClr val="5D6ABF"/>
-              </a:buClr>
-              <a:buSzPct val="25000"/>
-              <a:buFont typeface="Roboto"/>
-              <a:buNone/>
-            </a:pPr>
-            <a:endParaRPr sz="2400" b="1" i="0" u="none" strike="noStrike" cap="none">
-              <a:solidFill>
-                <a:srgbClr val="435B67"/>
-              </a:solidFill>
-              <a:latin typeface="Roboto"/>
-              <a:ea typeface="Roboto"/>
-              <a:cs typeface="Roboto"/>
-              <a:sym typeface="Roboto"/>
-            </a:endParaRPr>
-          </a:p>
-          <a:p>
-            <a:pPr marL="0" marR="0" lvl="0" indent="0" algn="ctr" rtl="0">
-              <a:lnSpc>
-                <a:spcPct val="100000"/>
-              </a:lnSpc>
-              <a:spcBef>
-                <a:spcPts val="800"/>
-              </a:spcBef>
-              <a:spcAft>
-                <a:spcPts val="0"/>
-              </a:spcAft>
-              <a:buClr>
-                <a:srgbClr val="5D6ABF"/>
-              </a:buClr>
-              <a:buSzPct val="25000"/>
-              <a:buFont typeface="Roboto"/>
-              <a:buNone/>
-            </a:pPr>
-            <a:r>
-              <a:rPr lang="en-US" sz="1800" b="0" i="0" u="none" strike="noStrike" cap="none">
-                <a:solidFill>
-                  <a:srgbClr val="445863"/>
-                </a:solidFill>
-                <a:latin typeface="Roboto"/>
-                <a:ea typeface="Roboto"/>
-                <a:cs typeface="Roboto"/>
-                <a:sym typeface="Roboto"/>
-              </a:rPr>
-              <a:t>npm is all you need</a:t>
-            </a:r>
-          </a:p>
-          <a:p>
-            <a:pPr marL="0" marR="0" lvl="0" indent="0" algn="ctr" rtl="0">
-              <a:lnSpc>
-                <a:spcPct val="100000"/>
-              </a:lnSpc>
-              <a:spcBef>
-                <a:spcPts val="800"/>
-              </a:spcBef>
-              <a:spcAft>
-                <a:spcPts val="0"/>
-              </a:spcAft>
-              <a:buClr>
-                <a:srgbClr val="5D6ABF"/>
-              </a:buClr>
-              <a:buSzPct val="25000"/>
-              <a:buFont typeface="Roboto"/>
-              <a:buNone/>
-            </a:pPr>
-            <a:r>
-              <a:rPr lang="en-US" sz="1800" b="0" i="0" u="none" strike="noStrike" cap="none">
-                <a:solidFill>
-                  <a:srgbClr val="445863"/>
-                </a:solidFill>
-                <a:latin typeface="Roboto"/>
-                <a:ea typeface="Roboto"/>
-                <a:cs typeface="Roboto"/>
-                <a:sym typeface="Roboto"/>
-              </a:rPr>
-              <a:t>Contribute to </a:t>
-            </a:r>
-            <a:r>
-              <a:rPr lang="en-US" sz="1800" b="0" i="0" u="sng" strike="noStrike" cap="none">
-                <a:solidFill>
-                  <a:schemeClr val="hlink"/>
-                </a:solidFill>
-                <a:latin typeface="Roboto"/>
-                <a:ea typeface="Roboto"/>
-                <a:cs typeface="Roboto"/>
-                <a:sym typeface="Roboto"/>
-                <a:hlinkClick r:id="rId3"/>
-              </a:rPr>
-              <a:t>DefinitelyTyped</a:t>
-            </a:r>
-            <a:r>
-              <a:rPr lang="en-US" sz="1800" b="0" i="0" u="none" strike="noStrike" cap="none">
-                <a:solidFill>
-                  <a:srgbClr val="445863"/>
-                </a:solidFill>
-                <a:latin typeface="Roboto"/>
-                <a:ea typeface="Roboto"/>
-                <a:cs typeface="Roboto"/>
-                <a:sym typeface="Roboto"/>
-              </a:rPr>
-              <a:t>!</a:t>
-            </a:r>
-          </a:p>
-        </p:txBody>
-      </p:sp>
-      <p:sp>
-        <p:nvSpPr>
-          <p:cNvPr id="393" name="Shape 393"/>
-          <p:cNvSpPr txBox="1">
-            <a:spLocks noGrp="1"/>
-          </p:cNvSpPr>
-          <p:nvPr>
-            <p:ph type="title"/>
-          </p:nvPr>
-        </p:nvSpPr>
-        <p:spPr>
-          <a:xfrm>
-            <a:off x="311700" y="272109"/>
-            <a:ext cx="1813199" cy="988200"/>
-          </a:xfrm>
-          <a:prstGeom prst="rect">
-            <a:avLst/>
-          </a:prstGeom>
-          <a:noFill/>
-          <a:ln>
-            <a:noFill/>
-          </a:ln>
-        </p:spPr>
-        <p:txBody>
-          <a:bodyPr lIns="34275" tIns="34275" rIns="34275" bIns="34275" anchor="t" anchorCtr="0">
-            <a:noAutofit/>
-          </a:bodyPr>
-          <a:lstStyle/>
-          <a:p>
-            <a:pPr marL="0" marR="0" lvl="0" indent="0" algn="l" rtl="0">
-              <a:lnSpc>
-                <a:spcPct val="100000"/>
-              </a:lnSpc>
-              <a:spcBef>
-                <a:spcPts val="0"/>
-              </a:spcBef>
-              <a:spcAft>
-                <a:spcPts val="0"/>
-              </a:spcAft>
-              <a:buClr>
-                <a:srgbClr val="FFFFFF"/>
-              </a:buClr>
-              <a:buSzPct val="25000"/>
-              <a:buFont typeface="Roboto"/>
-              <a:buNone/>
-            </a:pPr>
-            <a:r>
-              <a:rPr lang="en-US" sz="2400" b="1" i="0" u="none" strike="noStrike" cap="none">
-                <a:solidFill>
-                  <a:srgbClr val="FFFFFF"/>
-                </a:solidFill>
-                <a:latin typeface="Roboto"/>
-                <a:ea typeface="Roboto"/>
-                <a:cs typeface="Roboto"/>
-                <a:sym typeface="Roboto"/>
-              </a:rPr>
-              <a:t>Outline</a:t>
-            </a:r>
-          </a:p>
-        </p:txBody>
-      </p:sp>
-      <p:sp>
-        <p:nvSpPr>
-          <p:cNvPr id="394" name="Shape 394"/>
-          <p:cNvSpPr txBox="1"/>
-          <p:nvPr/>
-        </p:nvSpPr>
-        <p:spPr>
-          <a:xfrm>
-            <a:off x="257883" y="235029"/>
-            <a:ext cx="2291451" cy="525080"/>
-          </a:xfrm>
-          <a:prstGeom prst="rect">
-            <a:avLst/>
-          </a:prstGeom>
-          <a:noFill/>
-          <a:ln>
-            <a:noFill/>
-          </a:ln>
-        </p:spPr>
-        <p:txBody>
-          <a:bodyPr lIns="91425" tIns="45700" rIns="91425" bIns="45700" anchor="t" anchorCtr="0">
-            <a:noAutofit/>
-          </a:bodyPr>
-          <a:lstStyle/>
-          <a:p>
-            <a:pPr marL="0" marR="0" lvl="0" indent="0" algn="l" rtl="0">
-              <a:lnSpc>
-                <a:spcPct val="100000"/>
-              </a:lnSpc>
-              <a:spcBef>
-                <a:spcPts val="0"/>
-              </a:spcBef>
-              <a:spcAft>
-                <a:spcPts val="0"/>
-              </a:spcAft>
-              <a:buClr>
-                <a:srgbClr val="435B67"/>
-              </a:buClr>
-              <a:buSzPct val="25000"/>
-              <a:buFont typeface="Roboto"/>
-              <a:buNone/>
-            </a:pPr>
-            <a:r>
-              <a:rPr lang="en-US" sz="2400" b="1" i="0" u="none" strike="noStrike" cap="none">
-                <a:solidFill>
-                  <a:srgbClr val="435B67"/>
-                </a:solidFill>
-                <a:latin typeface="Roboto"/>
-                <a:ea typeface="Roboto"/>
-                <a:cs typeface="Roboto"/>
-                <a:sym typeface="Roboto"/>
-              </a:rPr>
-              <a:t>Demo Recap</a:t>
             </a:r>
           </a:p>
         </p:txBody>
@@ -25800,6 +26909,325 @@
 </file>
 
 <file path=ppt/slides/slide30.xml><?xml version="1.0" encoding="utf-8"?>
+<p:sld xmlns:a="http://schemas.openxmlformats.org/drawingml/2006/main" xmlns:r="http://schemas.openxmlformats.org/officeDocument/2006/relationships" xmlns:p="http://schemas.openxmlformats.org/presentationml/2006/main">
+  <p:cSld>
+    <p:spTree>
+      <p:nvGrpSpPr>
+        <p:cNvPr id="1" name="Shape 391"/>
+        <p:cNvGrpSpPr/>
+        <p:nvPr/>
+      </p:nvGrpSpPr>
+      <p:grpSpPr>
+        <a:xfrm>
+          <a:off x="0" y="0"/>
+          <a:ext cx="0" cy="0"/>
+          <a:chOff x="0" y="0"/>
+          <a:chExt cx="0" cy="0"/>
+        </a:xfrm>
+      </p:grpSpPr>
+      <p:sp>
+        <p:nvSpPr>
+          <p:cNvPr id="392" name="Shape 392"/>
+          <p:cNvSpPr txBox="1">
+            <a:spLocks noGrp="1"/>
+          </p:cNvSpPr>
+          <p:nvPr>
+            <p:ph type="body" idx="1"/>
+          </p:nvPr>
+        </p:nvSpPr>
+        <p:spPr>
+          <a:xfrm>
+            <a:off x="2818775" y="178081"/>
+            <a:ext cx="5772000" cy="3992105"/>
+          </a:xfrm>
+          <a:prstGeom prst="rect">
+            <a:avLst/>
+          </a:prstGeom>
+          <a:noFill/>
+          <a:ln>
+            <a:noFill/>
+          </a:ln>
+        </p:spPr>
+        <p:txBody>
+          <a:bodyPr lIns="91425" tIns="91425" rIns="91425" bIns="91425" anchor="t" anchorCtr="0">
+            <a:noAutofit/>
+          </a:bodyPr>
+          <a:lstStyle/>
+          <a:p>
+            <a:pPr marL="0" marR="0" lvl="0" indent="0" algn="ctr" rtl="0">
+              <a:lnSpc>
+                <a:spcPct val="115000"/>
+              </a:lnSpc>
+              <a:spcBef>
+                <a:spcPts val="0"/>
+              </a:spcBef>
+              <a:spcAft>
+                <a:spcPts val="0"/>
+              </a:spcAft>
+              <a:buClr>
+                <a:srgbClr val="5D6ABF"/>
+              </a:buClr>
+              <a:buSzPct val="25000"/>
+              <a:buFont typeface="Roboto"/>
+              <a:buNone/>
+            </a:pPr>
+            <a:r>
+              <a:rPr lang="en-US" sz="2400" b="1" i="0" u="none" strike="noStrike" cap="none">
+                <a:solidFill>
+                  <a:srgbClr val="435B67"/>
+                </a:solidFill>
+                <a:latin typeface="Roboto"/>
+                <a:ea typeface="Roboto"/>
+                <a:cs typeface="Roboto"/>
+                <a:sym typeface="Roboto"/>
+              </a:rPr>
+              <a:t>Type Acquisition</a:t>
+            </a:r>
+          </a:p>
+          <a:p>
+            <a:pPr marL="0" marR="0" lvl="0" indent="0" algn="ctr" rtl="0">
+              <a:lnSpc>
+                <a:spcPct val="115000"/>
+              </a:lnSpc>
+              <a:spcBef>
+                <a:spcPts val="0"/>
+              </a:spcBef>
+              <a:spcAft>
+                <a:spcPts val="0"/>
+              </a:spcAft>
+              <a:buClr>
+                <a:srgbClr val="5D6ABF"/>
+              </a:buClr>
+              <a:buSzPct val="25000"/>
+              <a:buFont typeface="Roboto"/>
+              <a:buNone/>
+            </a:pPr>
+            <a:endParaRPr sz="2400" b="1" i="0" u="none" strike="noStrike" cap="none">
+              <a:solidFill>
+                <a:srgbClr val="435B67"/>
+              </a:solidFill>
+              <a:latin typeface="Roboto"/>
+              <a:ea typeface="Roboto"/>
+              <a:cs typeface="Roboto"/>
+              <a:sym typeface="Roboto"/>
+            </a:endParaRPr>
+          </a:p>
+          <a:p>
+            <a:pPr marL="0" marR="0" lvl="0" indent="0" algn="ctr" rtl="0">
+              <a:lnSpc>
+                <a:spcPct val="100000"/>
+              </a:lnSpc>
+              <a:spcBef>
+                <a:spcPts val="800"/>
+              </a:spcBef>
+              <a:spcAft>
+                <a:spcPts val="0"/>
+              </a:spcAft>
+              <a:buClr>
+                <a:srgbClr val="5D6ABF"/>
+              </a:buClr>
+              <a:buSzPct val="25000"/>
+              <a:buFont typeface="Roboto"/>
+              <a:buNone/>
+            </a:pPr>
+            <a:r>
+              <a:rPr lang="en-US" sz="1800" b="0" i="0" u="none" strike="noStrike" cap="none">
+                <a:solidFill>
+                  <a:srgbClr val="445863"/>
+                </a:solidFill>
+                <a:latin typeface="Roboto"/>
+                <a:ea typeface="Roboto"/>
+                <a:cs typeface="Roboto"/>
+                <a:sym typeface="Roboto"/>
+              </a:rPr>
+              <a:t>npm is all you need</a:t>
+            </a:r>
+          </a:p>
+          <a:p>
+            <a:pPr marL="0" marR="0" lvl="0" indent="0" algn="ctr" rtl="0">
+              <a:lnSpc>
+                <a:spcPct val="100000"/>
+              </a:lnSpc>
+              <a:spcBef>
+                <a:spcPts val="800"/>
+              </a:spcBef>
+              <a:spcAft>
+                <a:spcPts val="0"/>
+              </a:spcAft>
+              <a:buClr>
+                <a:srgbClr val="5D6ABF"/>
+              </a:buClr>
+              <a:buSzPct val="25000"/>
+              <a:buFont typeface="Roboto"/>
+              <a:buNone/>
+            </a:pPr>
+            <a:r>
+              <a:rPr lang="en-US" sz="1800" b="0" i="0" u="none" strike="noStrike" cap="none">
+                <a:solidFill>
+                  <a:srgbClr val="445863"/>
+                </a:solidFill>
+                <a:latin typeface="Roboto"/>
+                <a:ea typeface="Roboto"/>
+                <a:cs typeface="Roboto"/>
+                <a:sym typeface="Roboto"/>
+              </a:rPr>
+              <a:t>Contribute to </a:t>
+            </a:r>
+            <a:r>
+              <a:rPr lang="en-US" sz="1800" b="0" i="0" u="sng" strike="noStrike" cap="none">
+                <a:solidFill>
+                  <a:schemeClr val="hlink"/>
+                </a:solidFill>
+                <a:latin typeface="Roboto"/>
+                <a:ea typeface="Roboto"/>
+                <a:cs typeface="Roboto"/>
+                <a:sym typeface="Roboto"/>
+                <a:hlinkClick r:id="rId3"/>
+              </a:rPr>
+              <a:t>DefinitelyTyped</a:t>
+            </a:r>
+            <a:r>
+              <a:rPr lang="en-US" sz="1800" b="0" i="0" u="none" strike="noStrike" cap="none">
+                <a:solidFill>
+                  <a:srgbClr val="445863"/>
+                </a:solidFill>
+                <a:latin typeface="Roboto"/>
+                <a:ea typeface="Roboto"/>
+                <a:cs typeface="Roboto"/>
+                <a:sym typeface="Roboto"/>
+              </a:rPr>
+              <a:t>!</a:t>
+            </a:r>
+          </a:p>
+        </p:txBody>
+      </p:sp>
+      <p:sp>
+        <p:nvSpPr>
+          <p:cNvPr id="393" name="Shape 393"/>
+          <p:cNvSpPr txBox="1">
+            <a:spLocks noGrp="1"/>
+          </p:cNvSpPr>
+          <p:nvPr>
+            <p:ph type="title"/>
+          </p:nvPr>
+        </p:nvSpPr>
+        <p:spPr>
+          <a:xfrm>
+            <a:off x="311700" y="272109"/>
+            <a:ext cx="1813199" cy="988200"/>
+          </a:xfrm>
+          <a:prstGeom prst="rect">
+            <a:avLst/>
+          </a:prstGeom>
+          <a:noFill/>
+          <a:ln>
+            <a:noFill/>
+          </a:ln>
+        </p:spPr>
+        <p:txBody>
+          <a:bodyPr lIns="34275" tIns="34275" rIns="34275" bIns="34275" anchor="t" anchorCtr="0">
+            <a:noAutofit/>
+          </a:bodyPr>
+          <a:lstStyle/>
+          <a:p>
+            <a:pPr marL="0" marR="0" lvl="0" indent="0" algn="l" rtl="0">
+              <a:lnSpc>
+                <a:spcPct val="100000"/>
+              </a:lnSpc>
+              <a:spcBef>
+                <a:spcPts val="0"/>
+              </a:spcBef>
+              <a:spcAft>
+                <a:spcPts val="0"/>
+              </a:spcAft>
+              <a:buClr>
+                <a:srgbClr val="FFFFFF"/>
+              </a:buClr>
+              <a:buSzPct val="25000"/>
+              <a:buFont typeface="Roboto"/>
+              <a:buNone/>
+            </a:pPr>
+            <a:r>
+              <a:rPr lang="en-US" sz="2400" b="1" i="0" u="none" strike="noStrike" cap="none">
+                <a:solidFill>
+                  <a:srgbClr val="FFFFFF"/>
+                </a:solidFill>
+                <a:latin typeface="Roboto"/>
+                <a:ea typeface="Roboto"/>
+                <a:cs typeface="Roboto"/>
+                <a:sym typeface="Roboto"/>
+              </a:rPr>
+              <a:t>Outline</a:t>
+            </a:r>
+          </a:p>
+        </p:txBody>
+      </p:sp>
+      <p:sp>
+        <p:nvSpPr>
+          <p:cNvPr id="394" name="Shape 394"/>
+          <p:cNvSpPr txBox="1"/>
+          <p:nvPr/>
+        </p:nvSpPr>
+        <p:spPr>
+          <a:xfrm>
+            <a:off x="257883" y="235029"/>
+            <a:ext cx="2291451" cy="525080"/>
+          </a:xfrm>
+          <a:prstGeom prst="rect">
+            <a:avLst/>
+          </a:prstGeom>
+          <a:noFill/>
+          <a:ln>
+            <a:noFill/>
+          </a:ln>
+        </p:spPr>
+        <p:txBody>
+          <a:bodyPr lIns="91425" tIns="45700" rIns="91425" bIns="45700" anchor="t" anchorCtr="0">
+            <a:noAutofit/>
+          </a:bodyPr>
+          <a:lstStyle/>
+          <a:p>
+            <a:pPr marL="0" marR="0" lvl="0" indent="0" algn="l" rtl="0">
+              <a:lnSpc>
+                <a:spcPct val="100000"/>
+              </a:lnSpc>
+              <a:spcBef>
+                <a:spcPts val="0"/>
+              </a:spcBef>
+              <a:spcAft>
+                <a:spcPts val="0"/>
+              </a:spcAft>
+              <a:buClr>
+                <a:srgbClr val="435B67"/>
+              </a:buClr>
+              <a:buSzPct val="25000"/>
+              <a:buFont typeface="Roboto"/>
+              <a:buNone/>
+            </a:pPr>
+            <a:r>
+              <a:rPr lang="en-US" sz="2400" b="1" i="0" u="none" strike="noStrike" cap="none">
+                <a:solidFill>
+                  <a:srgbClr val="435B67"/>
+                </a:solidFill>
+                <a:latin typeface="Roboto"/>
+                <a:ea typeface="Roboto"/>
+                <a:cs typeface="Roboto"/>
+                <a:sym typeface="Roboto"/>
+              </a:rPr>
+              <a:t>Demo Recap</a:t>
+            </a:r>
+          </a:p>
+        </p:txBody>
+      </p:sp>
+    </p:spTree>
+  </p:cSld>
+  <p:clrMapOvr>
+    <a:masterClrMapping/>
+  </p:clrMapOvr>
+</p:sld>
+</file>
+
+<file path=ppt/slides/slide31.xml><?xml version="1.0" encoding="utf-8"?>
 <p:sld xmlns:a="http://schemas.openxmlformats.org/drawingml/2006/main" xmlns:r="http://schemas.openxmlformats.org/officeDocument/2006/relationships" xmlns:p="http://schemas.openxmlformats.org/presentationml/2006/main">
   <p:cSld>
     <p:spTree>
@@ -26572,7 +28000,7 @@
 </p:sld>
 </file>
 
-<file path=ppt/slides/slide31.xml><?xml version="1.0" encoding="utf-8"?>
+<file path=ppt/slides/slide32.xml><?xml version="1.0" encoding="utf-8"?>
 <p:sld xmlns:a="http://schemas.openxmlformats.org/drawingml/2006/main" xmlns:r="http://schemas.openxmlformats.org/officeDocument/2006/relationships" xmlns:p="http://schemas.openxmlformats.org/presentationml/2006/main">
   <p:cSld>
     <p:spTree>
@@ -27821,7 +29249,7 @@
               <a:buNone/>
             </a:pPr>
             <a:r>
-              <a:rPr lang="en-US" sz="2800" b="1" i="0" u="none" strike="noStrike" cap="none">
+              <a:rPr lang="en-US" sz="2800" b="1" i="0" u="none" strike="noStrike" cap="none" dirty="0">
                 <a:solidFill>
                   <a:srgbClr val="435B67"/>
                 </a:solidFill>
@@ -27830,7 +29258,19 @@
                 <a:cs typeface="Arial"/>
                 <a:sym typeface="Arial"/>
               </a:rPr>
-              <a:t>Four Releases in One Year</a:t>
+              <a:t>Four Releases </a:t>
+            </a:r>
+            <a:r>
+              <a:rPr lang="en-US" sz="2800" b="1" i="0" u="none" strike="sngStrike" cap="none" dirty="0">
+                <a:solidFill>
+                  <a:srgbClr val="435B67"/>
+                </a:solidFill>
+                <a:latin typeface="Arial"/>
+                <a:ea typeface="Arial"/>
+                <a:cs typeface="Arial"/>
+                <a:sym typeface="Arial"/>
+              </a:rPr>
+              <a:t>in One Year</a:t>
             </a:r>
           </a:p>
         </p:txBody>
@@ -27843,7 +29283,7 @@
 </p:sld>
 </file>
 
-<file path=ppt/slides/slide32.xml><?xml version="1.0" encoding="utf-8"?>
+<file path=ppt/slides/slide33.xml><?xml version="1.0" encoding="utf-8"?>
 <p:sld xmlns:a="http://schemas.openxmlformats.org/drawingml/2006/main" xmlns:r="http://schemas.openxmlformats.org/officeDocument/2006/relationships" xmlns:p="http://schemas.openxmlformats.org/presentationml/2006/main">
   <p:cSld>
     <p:spTree>
@@ -28156,7 +29596,7 @@
 </p:sld>
 </file>
 
-<file path=ppt/slides/slide33.xml><?xml version="1.0" encoding="utf-8"?>
+<file path=ppt/slides/slide34.xml><?xml version="1.0" encoding="utf-8"?>
 <p:sld xmlns:a="http://schemas.openxmlformats.org/drawingml/2006/main" xmlns:r="http://schemas.openxmlformats.org/officeDocument/2006/relationships" xmlns:p="http://schemas.openxmlformats.org/presentationml/2006/main">
   <p:cSld>
     <p:spTree>
@@ -28241,7 +29681,7 @@
 </p:sld>
 </file>
 
-<file path=ppt/slides/slide34.xml><?xml version="1.0" encoding="utf-8"?>
+<file path=ppt/slides/slide35.xml><?xml version="1.0" encoding="utf-8"?>
 <p:sld xmlns:a="http://schemas.openxmlformats.org/drawingml/2006/main" xmlns:r="http://schemas.openxmlformats.org/officeDocument/2006/relationships" xmlns:p="http://schemas.openxmlformats.org/presentationml/2006/main">
   <p:cSld>
     <p:spTree>
@@ -28354,7 +29794,7 @@
 </p:sld>
 </file>
 
-<file path=ppt/slides/slide35.xml><?xml version="1.0" encoding="utf-8"?>
+<file path=ppt/slides/slide36.xml><?xml version="1.0" encoding="utf-8"?>
 <p:sld xmlns:a="http://schemas.openxmlformats.org/drawingml/2006/main" xmlns:r="http://schemas.openxmlformats.org/officeDocument/2006/relationships" xmlns:p="http://schemas.openxmlformats.org/presentationml/2006/main">
   <p:cSld>
     <p:spTree>
@@ -28648,7 +30088,7 @@
 </p:sld>
 </file>
 
-<file path=ppt/slides/slide36.xml><?xml version="1.0" encoding="utf-8"?>
+<file path=ppt/slides/slide37.xml><?xml version="1.0" encoding="utf-8"?>
 <p:sld xmlns:a="http://schemas.openxmlformats.org/drawingml/2006/main" xmlns:r="http://schemas.openxmlformats.org/officeDocument/2006/relationships" xmlns:p="http://schemas.openxmlformats.org/presentationml/2006/main">
   <p:cSld>
     <p:spTree>
@@ -28919,7 +30359,7 @@
 </p:sld>
 </file>
 
-<file path=ppt/slides/slide37.xml><?xml version="1.0" encoding="utf-8"?>
+<file path=ppt/slides/slide38.xml><?xml version="1.0" encoding="utf-8"?>
 <p:sld xmlns:a="http://schemas.openxmlformats.org/drawingml/2006/main" xmlns:r="http://schemas.openxmlformats.org/officeDocument/2006/relationships" xmlns:p="http://schemas.openxmlformats.org/presentationml/2006/main">
   <p:cSld>
     <p:spTree>
@@ -28983,7 +30423,7 @@
               <a:buNone/>
             </a:pPr>
             <a:r>
-              <a:rPr lang="en-US" sz="3200" b="1" i="0" u="none" strike="noStrike" cap="none">
+              <a:rPr lang="en-US" sz="3200" b="1" i="0" u="none" strike="noStrike" cap="none" dirty="0">
                 <a:solidFill>
                   <a:srgbClr val="004B53"/>
                 </a:solidFill>
@@ -29013,7 +30453,7 @@
               <a:buFont typeface="Roboto"/>
               <a:buNone/>
             </a:pPr>
-            <a:endParaRPr sz="1500" b="0" i="0" u="none" strike="noStrike" cap="none">
+            <a:endParaRPr sz="1500" b="0" i="0" u="none" strike="noStrike" cap="none" dirty="0">
               <a:solidFill>
                 <a:srgbClr val="004B53"/>
               </a:solidFill>
@@ -29042,7 +30482,7 @@
               <a:buChar char="•"/>
             </a:pPr>
             <a:r>
-              <a:rPr lang="en-US" sz="1500" b="0" i="0" u="none" strike="noStrike" cap="none">
+              <a:rPr lang="en-US" sz="1500" b="0" i="0" u="none" strike="noStrike" cap="none" dirty="0">
                 <a:solidFill>
                   <a:srgbClr val="004B53"/>
                 </a:solidFill>
@@ -29054,7 +30494,7 @@
               <a:t>We’re on GitHub! (</a:t>
             </a:r>
             <a:r>
-              <a:rPr lang="en-US" sz="1500" b="0" i="0" u="sng" strike="noStrike" cap="none">
+              <a:rPr lang="en-US" sz="1500" b="0" i="0" u="sng" strike="noStrike" cap="none" dirty="0">
                 <a:solidFill>
                   <a:schemeClr val="hlink"/>
                 </a:solidFill>
@@ -29067,7 +30507,7 @@
               <a:t>https://github.com/Microsoft/TypeScript</a:t>
             </a:r>
             <a:r>
-              <a:rPr lang="en-US" sz="1500" b="0" i="0" u="none" strike="noStrike" cap="none">
+              <a:rPr lang="en-US" sz="1500" b="0" i="0" u="none" strike="noStrike" cap="none" dirty="0">
                 <a:solidFill>
                   <a:srgbClr val="004B53"/>
                 </a:solidFill>
@@ -29098,7 +30538,7 @@
               <a:buChar char="•"/>
             </a:pPr>
             <a:r>
-              <a:rPr lang="en-US" sz="1500" b="0" i="0" u="none" strike="noStrike" cap="none">
+              <a:rPr lang="en-US" sz="1500" b="0" i="0" u="none" strike="noStrike" cap="none" dirty="0">
                 <a:solidFill>
                   <a:srgbClr val="004B53"/>
                 </a:solidFill>
@@ -29129,7 +30569,7 @@
               <a:buChar char="•"/>
             </a:pPr>
             <a:r>
-              <a:rPr lang="en-US" sz="1500" b="0" i="0" u="none" strike="noStrike" cap="none">
+              <a:rPr lang="en-US" sz="1500" b="0" i="0" u="none" strike="noStrike" cap="none" dirty="0">
                 <a:solidFill>
                   <a:srgbClr val="004B53"/>
                 </a:solidFill>
@@ -29141,7 +30581,7 @@
               <a:t>And Gitter! (</a:t>
             </a:r>
             <a:r>
-              <a:rPr lang="en-US" sz="1500" b="0" i="0" u="sng" strike="noStrike" cap="none">
+              <a:rPr lang="en-US" sz="1500" b="0" i="0" u="sng" strike="noStrike" cap="none" dirty="0">
                 <a:solidFill>
                   <a:schemeClr val="hlink"/>
                 </a:solidFill>
@@ -29154,7 +30594,7 @@
               <a:t>https://gitter.im/Microsoft/TypeScript</a:t>
             </a:r>
             <a:r>
-              <a:rPr lang="en-US" sz="1500" b="0" i="0" u="none" strike="noStrike" cap="none">
+              <a:rPr lang="en-US" sz="1500" b="0" i="0" u="none" strike="noStrike" cap="none" dirty="0">
                 <a:solidFill>
                   <a:srgbClr val="004B53"/>
                 </a:solidFill>
@@ -29185,7 +30625,7 @@
               <a:buChar char="•"/>
             </a:pPr>
             <a:r>
-              <a:rPr lang="en-US" sz="1500" b="0" i="0" u="none" strike="noStrike" cap="none">
+              <a:rPr lang="en-US" sz="1500" b="0" i="0" u="none" strike="noStrike" cap="none" dirty="0">
                 <a:solidFill>
                   <a:srgbClr val="004B53"/>
                 </a:solidFill>
@@ -29197,7 +30637,7 @@
               <a:t>Demo code will be posted at </a:t>
             </a:r>
             <a:r>
-              <a:rPr lang="en-US" sz="1600" b="0" i="0" u="sng" strike="noStrike" cap="none">
+              <a:rPr lang="en-US" sz="1600" b="0" i="0" u="sng" strike="noStrike" cap="none" dirty="0">
                 <a:solidFill>
                   <a:schemeClr val="hlink"/>
                 </a:solidFill>
@@ -29220,7 +30660,7 @@
 </p:sld>
 </file>
 
-<file path=ppt/slides/slide38.xml><?xml version="1.0" encoding="utf-8"?>
+<file path=ppt/slides/slide39.xml><?xml version="1.0" encoding="utf-8"?>
 <p:sld xmlns:a="http://schemas.openxmlformats.org/drawingml/2006/main" xmlns:r="http://schemas.openxmlformats.org/officeDocument/2006/relationships" xmlns:p="http://schemas.openxmlformats.org/presentationml/2006/main">
   <p:cSld>
     <p:bg>
@@ -30475,10 +31915,10 @@
         </p:nvGrpSpPr>
         <p:grpSpPr>
           <a:xfrm>
-            <a:off x="594115" y="685472"/>
-            <a:ext cx="7569221" cy="1334512"/>
-            <a:chOff x="876569" y="364698"/>
-            <a:chExt cx="10294667" cy="1815029"/>
+            <a:off x="594115" y="592543"/>
+            <a:ext cx="7569220" cy="1427441"/>
+            <a:chOff x="876569" y="238308"/>
+            <a:chExt cx="10294666" cy="1941418"/>
           </a:xfrm>
         </p:grpSpPr>
         <p:cxnSp>
@@ -30864,9 +32304,9 @@
             <p:nvPr/>
           </p:nvSpPr>
           <p:spPr>
-            <a:xfrm rot="-3297300">
-              <a:off x="8189246" y="750342"/>
-              <a:ext cx="1042103" cy="516972"/>
+            <a:xfrm rot="18302700">
+              <a:off x="8165582" y="704839"/>
+              <a:ext cx="1153260" cy="516972"/>
             </a:xfrm>
             <a:prstGeom prst="rect">
               <a:avLst/>
@@ -30900,7 +32340,7 @@
                 <a:buNone/>
               </a:pPr>
               <a:r>
-                <a:rPr lang="en-US" sz="1176" b="0" i="0" u="none" strike="noStrike" cap="none">
+                <a:rPr lang="en-US" sz="1176" b="0" i="0" u="none" strike="noStrike" cap="none" dirty="0">
                   <a:solidFill>
                     <a:srgbClr val="505050"/>
                   </a:solidFill>
@@ -30921,9 +32361,9 @@
             <p:nvPr/>
           </p:nvSpPr>
           <p:spPr>
-            <a:xfrm rot="-3297300">
-              <a:off x="9096385" y="695186"/>
-              <a:ext cx="1076206" cy="516972"/>
+            <a:xfrm rot="18302700">
+              <a:off x="9054885" y="615391"/>
+              <a:ext cx="1271138" cy="516972"/>
             </a:xfrm>
             <a:prstGeom prst="rect">
               <a:avLst/>
@@ -31143,63 +32583,6 @@
           </a:p>
         </p:txBody>
       </p:sp>
-      <p:sp>
-        <p:nvSpPr>
-          <p:cNvPr id="210" name="Shape 210"/>
-          <p:cNvSpPr txBox="1"/>
-          <p:nvPr/>
-        </p:nvSpPr>
-        <p:spPr>
-          <a:xfrm>
-            <a:off x="4928875" y="4473942"/>
-            <a:ext cx="1405678" cy="400626"/>
-          </a:xfrm>
-          <a:prstGeom prst="rect">
-            <a:avLst/>
-          </a:prstGeom>
-          <a:noFill/>
-          <a:ln>
-            <a:noFill/>
-          </a:ln>
-        </p:spPr>
-        <p:txBody>
-          <a:bodyPr lIns="134450" tIns="107550" rIns="134450" bIns="107550" anchor="t" anchorCtr="0">
-            <a:noAutofit/>
-          </a:bodyPr>
-          <a:lstStyle/>
-          <a:p>
-            <a:pPr marL="0" marR="0" lvl="0" indent="0" algn="l" rtl="0">
-              <a:lnSpc>
-                <a:spcPct val="90000"/>
-              </a:lnSpc>
-              <a:spcBef>
-                <a:spcPts val="0"/>
-              </a:spcBef>
-              <a:spcAft>
-                <a:spcPts val="0"/>
-              </a:spcAft>
-              <a:buClr>
-                <a:srgbClr val="505050"/>
-              </a:buClr>
-              <a:buSzPct val="25000"/>
-              <a:buFont typeface="Quattrocento Sans"/>
-              <a:buNone/>
-            </a:pPr>
-            <a:r>
-              <a:rPr lang="en-US" sz="1324" b="0" i="0" u="none" strike="noStrike" cap="none">
-                <a:solidFill>
-                  <a:srgbClr val="505050"/>
-                </a:solidFill>
-                <a:latin typeface="Quattrocento Sans"/>
-                <a:ea typeface="Quattrocento Sans"/>
-                <a:cs typeface="Quattrocento Sans"/>
-                <a:sym typeface="Quattrocento Sans"/>
-              </a:rPr>
-              <a:t>Dec 2016</a:t>
-            </a:r>
-          </a:p>
-        </p:txBody>
-      </p:sp>
     </p:spTree>
   </p:cSld>
   <p:clrMapOvr>
@@ -31208,89 +32591,6 @@
   <p:transition>
     <p:fade/>
   </p:transition>
-  <p:timing>
-    <p:tnLst>
-      <p:par>
-        <p:cTn id="1" dur="indefinite" restart="never" nodeType="tmRoot">
-          <p:childTnLst>
-            <p:seq concurrent="1" nextAc="seek">
-              <p:cTn id="2" dur="indefinite" nodeType="mainSeq">
-                <p:childTnLst>
-                  <p:par>
-                    <p:cTn id="3" fill="hold">
-                      <p:stCondLst>
-                        <p:cond delay="indefinite"/>
-                      </p:stCondLst>
-                      <p:childTnLst>
-                        <p:par>
-                          <p:cTn id="4" fill="hold">
-                            <p:stCondLst>
-                              <p:cond delay="0"/>
-                            </p:stCondLst>
-                            <p:childTnLst>
-                              <p:par>
-                                <p:cTn id="5" presetID="10" presetClass="entr" presetSubtype="0" fill="hold" nodeType="clickEffect">
-                                  <p:stCondLst>
-                                    <p:cond delay="0"/>
-                                  </p:stCondLst>
-                                  <p:childTnLst>
-                                    <p:set>
-                                      <p:cBhvr>
-                                        <p:cTn id="6" dur="1" fill="hold">
-                                          <p:stCondLst>
-                                            <p:cond delay="0"/>
-                                          </p:stCondLst>
-                                        </p:cTn>
-                                        <p:tgtEl>
-                                          <p:spTgt spid="210"/>
-                                        </p:tgtEl>
-                                        <p:attrNameLst>
-                                          <p:attrName>style.visibility</p:attrName>
-                                        </p:attrNameLst>
-                                      </p:cBhvr>
-                                      <p:to>
-                                        <p:strVal val="visible"/>
-                                      </p:to>
-                                    </p:set>
-                                    <p:animEffect transition="in" filter="fade">
-                                      <p:cBhvr>
-                                        <p:cTn id="7" dur="500"/>
-                                        <p:tgtEl>
-                                          <p:spTgt spid="210"/>
-                                        </p:tgtEl>
-                                      </p:cBhvr>
-                                    </p:animEffect>
-                                  </p:childTnLst>
-                                </p:cTn>
-                              </p:par>
-                            </p:childTnLst>
-                          </p:cTn>
-                        </p:par>
-                      </p:childTnLst>
-                    </p:cTn>
-                  </p:par>
-                </p:childTnLst>
-              </p:cTn>
-              <p:prevCondLst>
-                <p:cond evt="onPrev" delay="0">
-                  <p:tgtEl>
-                    <p:sldTgt/>
-                  </p:tgtEl>
-                </p:cond>
-              </p:prevCondLst>
-              <p:nextCondLst>
-                <p:cond evt="onNext" delay="0">
-                  <p:tgtEl>
-                    <p:sldTgt/>
-                  </p:tgtEl>
-                </p:cond>
-              </p:nextCondLst>
-            </p:seq>
-          </p:childTnLst>
-        </p:cTn>
-      </p:par>
-    </p:tnLst>
-  </p:timing>
 </p:sld>
 </file>
 

</xml_diff>